<commit_message>
something weird with 5 branch tree
</commit_message>
<xml_diff>
--- a/Presentations/D2P_Slide_Deck_for_Live_Presentation.pptx
+++ b/Presentations/D2P_Slide_Deck_for_Live_Presentation.pptx
@@ -11510,7 +11510,7 @@
         </p:nvSpPr>
         <p:spPr>
           <a:xfrm>
-            <a:off x="1206000" y="2661804"/>
+            <a:off x="1367996" y="2291463"/>
             <a:ext cx="222421" cy="331572"/>
           </a:xfrm>
           <a:prstGeom prst="flowChartOffpageConnector">
@@ -11561,7 +11561,7 @@
         </p:nvSpPr>
         <p:spPr>
           <a:xfrm>
-            <a:off x="8680712" y="2583052"/>
+            <a:off x="9338313" y="2460968"/>
             <a:ext cx="222421" cy="331572"/>
           </a:xfrm>
           <a:prstGeom prst="flowChartOffpageConnector">
@@ -11669,7 +11669,7 @@
         </p:nvSpPr>
         <p:spPr>
           <a:xfrm>
-            <a:off x="2088412" y="2714259"/>
+            <a:off x="2250408" y="2343918"/>
             <a:ext cx="222421" cy="222422"/>
           </a:xfrm>
           <a:prstGeom prst="ellipse">
@@ -11718,7 +11718,7 @@
         </p:nvSpPr>
         <p:spPr>
           <a:xfrm>
-            <a:off x="1765077" y="3268253"/>
+            <a:off x="1927073" y="2897912"/>
             <a:ext cx="222421" cy="222422"/>
           </a:xfrm>
           <a:prstGeom prst="ellipse">
@@ -11770,7 +11770,7 @@
         </p:nvSpPr>
         <p:spPr>
           <a:xfrm>
-            <a:off x="2411748" y="3268253"/>
+            <a:off x="2573744" y="2897912"/>
             <a:ext cx="222421" cy="222422"/>
           </a:xfrm>
           <a:prstGeom prst="ellipse">
@@ -11822,7 +11822,7 @@
         </p:nvSpPr>
         <p:spPr>
           <a:xfrm>
-            <a:off x="9581684" y="2583052"/>
+            <a:off x="10239285" y="2460968"/>
             <a:ext cx="222421" cy="222422"/>
           </a:xfrm>
           <a:prstGeom prst="ellipse">
@@ -11871,7 +11871,7 @@
         </p:nvSpPr>
         <p:spPr>
           <a:xfrm>
-            <a:off x="9905020" y="3137046"/>
+            <a:off x="10562621" y="3014962"/>
             <a:ext cx="222421" cy="222422"/>
           </a:xfrm>
           <a:prstGeom prst="ellipse">
@@ -11923,7 +11923,7 @@
         </p:nvSpPr>
         <p:spPr>
           <a:xfrm>
-            <a:off x="9258348" y="3141165"/>
+            <a:off x="9915949" y="3019081"/>
             <a:ext cx="222421" cy="222422"/>
           </a:xfrm>
           <a:prstGeom prst="ellipse">
@@ -11972,7 +11972,7 @@
         </p:nvSpPr>
         <p:spPr>
           <a:xfrm>
-            <a:off x="8935013" y="3695159"/>
+            <a:off x="9592614" y="3573075"/>
             <a:ext cx="222421" cy="222422"/>
           </a:xfrm>
           <a:prstGeom prst="ellipse">
@@ -12024,7 +12024,7 @@
         </p:nvSpPr>
         <p:spPr>
           <a:xfrm>
-            <a:off x="9581684" y="3695159"/>
+            <a:off x="10239285" y="3573075"/>
             <a:ext cx="222421" cy="222422"/>
           </a:xfrm>
           <a:prstGeom prst="ellipse">
@@ -12536,7 +12536,7 @@
         </p:nvCxnSpPr>
         <p:spPr>
           <a:xfrm flipV="1">
-            <a:off x="1876288" y="2936681"/>
+            <a:off x="2038284" y="2566340"/>
             <a:ext cx="323335" cy="331572"/>
           </a:xfrm>
           <a:prstGeom prst="line">
@@ -12580,7 +12580,7 @@
         </p:nvCxnSpPr>
         <p:spPr>
           <a:xfrm>
-            <a:off x="2199623" y="2936681"/>
+            <a:off x="2361619" y="2566340"/>
             <a:ext cx="323336" cy="331572"/>
           </a:xfrm>
           <a:prstGeom prst="line">
@@ -12618,13 +12618,12 @@
           </p:cNvPr>
           <p:cNvCxnSpPr>
             <a:stCxn id="19" idx="0"/>
-            <a:endCxn id="17" idx="4"/>
           </p:cNvCxnSpPr>
           <p:nvPr/>
         </p:nvCxnSpPr>
         <p:spPr>
           <a:xfrm flipV="1">
-            <a:off x="9369559" y="2805474"/>
+            <a:off x="10027160" y="2683390"/>
             <a:ext cx="323336" cy="335691"/>
           </a:xfrm>
           <a:prstGeom prst="line">
@@ -12668,7 +12667,7 @@
         </p:nvCxnSpPr>
         <p:spPr>
           <a:xfrm flipV="1">
-            <a:off x="9046224" y="3363587"/>
+            <a:off x="9703825" y="3241503"/>
             <a:ext cx="323335" cy="331572"/>
           </a:xfrm>
           <a:prstGeom prst="line">
@@ -12707,13 +12706,12 @@
           <p:cNvCxnSpPr>
             <a:cxnSpLocks/>
             <a:stCxn id="18" idx="0"/>
-            <a:endCxn id="17" idx="4"/>
           </p:cNvCxnSpPr>
           <p:nvPr/>
         </p:nvCxnSpPr>
         <p:spPr>
           <a:xfrm flipH="1" flipV="1">
-            <a:off x="9692895" y="2805474"/>
+            <a:off x="10350496" y="2683390"/>
             <a:ext cx="323336" cy="331572"/>
           </a:xfrm>
           <a:prstGeom prst="line">
@@ -12758,7 +12756,7 @@
         </p:nvCxnSpPr>
         <p:spPr>
           <a:xfrm>
-            <a:off x="9369559" y="3363587"/>
+            <a:off x="10027160" y="3241503"/>
             <a:ext cx="323336" cy="331572"/>
           </a:xfrm>
           <a:prstGeom prst="line">
@@ -13159,7 +13157,7 @@
         </p:nvSpPr>
         <p:spPr>
           <a:xfrm>
-            <a:off x="2505193" y="2055803"/>
+            <a:off x="2809486" y="2224296"/>
             <a:ext cx="1373811" cy="461665"/>
           </a:xfrm>
           <a:prstGeom prst="rect">
@@ -13211,15 +13209,15 @@
           </p:cNvPr>
           <p:cNvCxnSpPr>
             <a:cxnSpLocks/>
-            <a:stCxn id="4" idx="2"/>
-            <a:endCxn id="14" idx="7"/>
+            <a:stCxn id="4" idx="1"/>
+            <a:endCxn id="14" idx="6"/>
           </p:cNvCxnSpPr>
           <p:nvPr/>
         </p:nvCxnSpPr>
         <p:spPr>
           <a:xfrm flipH="1">
-            <a:off x="2278260" y="2517468"/>
-            <a:ext cx="913839" cy="229364"/>
+            <a:off x="2472829" y="2455129"/>
+            <a:ext cx="336657" cy="0"/>
           </a:xfrm>
           <a:prstGeom prst="straightConnector1">
             <a:avLst/>
@@ -13260,7 +13258,7 @@
         </p:nvSpPr>
         <p:spPr>
           <a:xfrm>
-            <a:off x="9747364" y="2024939"/>
+            <a:off x="9232219" y="2002207"/>
             <a:ext cx="2236551" cy="276999"/>
           </a:xfrm>
           <a:prstGeom prst="rect">
@@ -13313,14 +13311,14 @@
           <p:cNvCxnSpPr>
             <a:cxnSpLocks/>
             <a:stCxn id="48" idx="2"/>
-            <a:endCxn id="17" idx="6"/>
+            <a:endCxn id="17" idx="0"/>
           </p:cNvCxnSpPr>
           <p:nvPr/>
         </p:nvCxnSpPr>
         <p:spPr>
-          <a:xfrm flipH="1">
-            <a:off x="9804105" y="2301938"/>
-            <a:ext cx="1061535" cy="392325"/>
+          <a:xfrm>
+            <a:off x="10350495" y="2279206"/>
+            <a:ext cx="1" cy="181762"/>
           </a:xfrm>
           <a:prstGeom prst="straightConnector1">
             <a:avLst/>
@@ -13361,7 +13359,7 @@
         </p:nvSpPr>
         <p:spPr>
           <a:xfrm>
-            <a:off x="7517423" y="3167111"/>
+            <a:off x="8175024" y="3045027"/>
             <a:ext cx="1367131" cy="461665"/>
           </a:xfrm>
           <a:prstGeom prst="rect">
@@ -13420,7 +13418,7 @@
         </p:nvCxnSpPr>
         <p:spPr>
           <a:xfrm flipV="1">
-            <a:off x="8884554" y="3252376"/>
+            <a:off x="9542155" y="3130292"/>
             <a:ext cx="373794" cy="145568"/>
           </a:xfrm>
           <a:prstGeom prst="straightConnector1">

</xml_diff>

<commit_message>
ran 5 branch tree and update ppt
</commit_message>
<xml_diff>
--- a/Presentations/D2P_Slide_Deck_for_Live_Presentation.pptx
+++ b/Presentations/D2P_Slide_Deck_for_Live_Presentation.pptx
@@ -11510,7 +11510,7 @@
         </p:nvSpPr>
         <p:spPr>
           <a:xfrm>
-            <a:off x="1367996" y="2291463"/>
+            <a:off x="524546" y="2193513"/>
             <a:ext cx="222421" cy="331572"/>
           </a:xfrm>
           <a:prstGeom prst="flowChartOffpageConnector">
@@ -11561,7 +11561,7 @@
         </p:nvSpPr>
         <p:spPr>
           <a:xfrm>
-            <a:off x="9338313" y="2460968"/>
+            <a:off x="4972607" y="2278541"/>
             <a:ext cx="222421" cy="331572"/>
           </a:xfrm>
           <a:prstGeom prst="flowChartOffpageConnector">
@@ -11615,7 +11615,7 @@
         </p:nvSpPr>
         <p:spPr>
           <a:xfrm>
-            <a:off x="4947106" y="4725288"/>
+            <a:off x="2215605" y="4663683"/>
             <a:ext cx="222421" cy="331572"/>
           </a:xfrm>
           <a:prstGeom prst="flowChartOffpageConnector">
@@ -11669,7 +11669,7 @@
         </p:nvSpPr>
         <p:spPr>
           <a:xfrm>
-            <a:off x="2250408" y="2343918"/>
+            <a:off x="1406958" y="2245968"/>
             <a:ext cx="222421" cy="222422"/>
           </a:xfrm>
           <a:prstGeom prst="ellipse">
@@ -11718,7 +11718,7 @@
         </p:nvSpPr>
         <p:spPr>
           <a:xfrm>
-            <a:off x="1927073" y="2897912"/>
+            <a:off x="1083623" y="2799962"/>
             <a:ext cx="222421" cy="222422"/>
           </a:xfrm>
           <a:prstGeom prst="ellipse">
@@ -11770,7 +11770,7 @@
         </p:nvSpPr>
         <p:spPr>
           <a:xfrm>
-            <a:off x="2573744" y="2897912"/>
+            <a:off x="1730294" y="2799962"/>
             <a:ext cx="222421" cy="222422"/>
           </a:xfrm>
           <a:prstGeom prst="ellipse">
@@ -11822,7 +11822,7 @@
         </p:nvSpPr>
         <p:spPr>
           <a:xfrm>
-            <a:off x="10239285" y="2460968"/>
+            <a:off x="5873579" y="2278541"/>
             <a:ext cx="222421" cy="222422"/>
           </a:xfrm>
           <a:prstGeom prst="ellipse">
@@ -11871,7 +11871,7 @@
         </p:nvSpPr>
         <p:spPr>
           <a:xfrm>
-            <a:off x="10562621" y="3014962"/>
+            <a:off x="6196915" y="2832535"/>
             <a:ext cx="222421" cy="222422"/>
           </a:xfrm>
           <a:prstGeom prst="ellipse">
@@ -11923,7 +11923,7 @@
         </p:nvSpPr>
         <p:spPr>
           <a:xfrm>
-            <a:off x="9915949" y="3019081"/>
+            <a:off x="5550243" y="2836654"/>
             <a:ext cx="222421" cy="222422"/>
           </a:xfrm>
           <a:prstGeom prst="ellipse">
@@ -11972,7 +11972,7 @@
         </p:nvSpPr>
         <p:spPr>
           <a:xfrm>
-            <a:off x="9592614" y="3573075"/>
+            <a:off x="5226908" y="3390648"/>
             <a:ext cx="222421" cy="222422"/>
           </a:xfrm>
           <a:prstGeom prst="ellipse">
@@ -12024,7 +12024,7 @@
         </p:nvSpPr>
         <p:spPr>
           <a:xfrm>
-            <a:off x="10239285" y="3573075"/>
+            <a:off x="5873579" y="3390648"/>
             <a:ext cx="222421" cy="222422"/>
           </a:xfrm>
           <a:prstGeom prst="ellipse">
@@ -12076,7 +12076,7 @@
         </p:nvSpPr>
         <p:spPr>
           <a:xfrm>
-            <a:off x="5593777" y="4891074"/>
+            <a:off x="2862276" y="4829469"/>
             <a:ext cx="222421" cy="222422"/>
           </a:xfrm>
           <a:prstGeom prst="ellipse">
@@ -12125,7 +12125,7 @@
         </p:nvSpPr>
         <p:spPr>
           <a:xfrm>
-            <a:off x="4947106" y="5445068"/>
+            <a:off x="2215605" y="5383463"/>
             <a:ext cx="222421" cy="222422"/>
           </a:xfrm>
           <a:prstGeom prst="ellipse">
@@ -12174,7 +12174,7 @@
         </p:nvSpPr>
         <p:spPr>
           <a:xfrm>
-            <a:off x="6190989" y="5445068"/>
+            <a:off x="3459488" y="5383463"/>
             <a:ext cx="222421" cy="222422"/>
           </a:xfrm>
           <a:prstGeom prst="ellipse">
@@ -12223,7 +12223,7 @@
         </p:nvSpPr>
         <p:spPr>
           <a:xfrm>
-            <a:off x="4622700" y="5999062"/>
+            <a:off x="1891199" y="5937457"/>
             <a:ext cx="222421" cy="222422"/>
           </a:xfrm>
           <a:prstGeom prst="ellipse">
@@ -12275,7 +12275,7 @@
         </p:nvSpPr>
         <p:spPr>
           <a:xfrm>
-            <a:off x="5269371" y="5999062"/>
+            <a:off x="2537870" y="5937457"/>
             <a:ext cx="222421" cy="222422"/>
           </a:xfrm>
           <a:prstGeom prst="ellipse">
@@ -12327,7 +12327,7 @@
         </p:nvSpPr>
         <p:spPr>
           <a:xfrm>
-            <a:off x="5876895" y="5999062"/>
+            <a:off x="3145394" y="5937457"/>
             <a:ext cx="222421" cy="222422"/>
           </a:xfrm>
           <a:prstGeom prst="ellipse">
@@ -12379,7 +12379,7 @@
         </p:nvSpPr>
         <p:spPr>
           <a:xfrm>
-            <a:off x="6523566" y="5999062"/>
+            <a:off x="3792065" y="5937457"/>
             <a:ext cx="222421" cy="222422"/>
           </a:xfrm>
           <a:prstGeom prst="ellipse">
@@ -12428,7 +12428,7 @@
         </p:nvSpPr>
         <p:spPr>
           <a:xfrm>
-            <a:off x="6193215" y="6569532"/>
+            <a:off x="3461714" y="6507927"/>
             <a:ext cx="222421" cy="222422"/>
           </a:xfrm>
           <a:prstGeom prst="ellipse">
@@ -12480,7 +12480,7 @@
         </p:nvSpPr>
         <p:spPr>
           <a:xfrm>
-            <a:off x="6839886" y="6569532"/>
+            <a:off x="4108385" y="6507927"/>
             <a:ext cx="222421" cy="222422"/>
           </a:xfrm>
           <a:prstGeom prst="ellipse">
@@ -12536,7 +12536,7 @@
         </p:nvCxnSpPr>
         <p:spPr>
           <a:xfrm flipV="1">
-            <a:off x="2038284" y="2566340"/>
+            <a:off x="1194834" y="2468390"/>
             <a:ext cx="323335" cy="331572"/>
           </a:xfrm>
           <a:prstGeom prst="line">
@@ -12580,7 +12580,7 @@
         </p:nvCxnSpPr>
         <p:spPr>
           <a:xfrm>
-            <a:off x="2361619" y="2566340"/>
+            <a:off x="1518169" y="2468390"/>
             <a:ext cx="323336" cy="331572"/>
           </a:xfrm>
           <a:prstGeom prst="line">
@@ -12623,7 +12623,7 @@
         </p:nvCxnSpPr>
         <p:spPr>
           <a:xfrm flipV="1">
-            <a:off x="10027160" y="2683390"/>
+            <a:off x="5661454" y="2500963"/>
             <a:ext cx="323336" cy="335691"/>
           </a:xfrm>
           <a:prstGeom prst="line">
@@ -12667,7 +12667,7 @@
         </p:nvCxnSpPr>
         <p:spPr>
           <a:xfrm flipV="1">
-            <a:off x="9703825" y="3241503"/>
+            <a:off x="5338119" y="3059076"/>
             <a:ext cx="323335" cy="331572"/>
           </a:xfrm>
           <a:prstGeom prst="line">
@@ -12711,7 +12711,7 @@
         </p:nvCxnSpPr>
         <p:spPr>
           <a:xfrm flipH="1" flipV="1">
-            <a:off x="10350496" y="2683390"/>
+            <a:off x="5984790" y="2500963"/>
             <a:ext cx="323336" cy="331572"/>
           </a:xfrm>
           <a:prstGeom prst="line">
@@ -12756,7 +12756,7 @@
         </p:nvCxnSpPr>
         <p:spPr>
           <a:xfrm>
-            <a:off x="10027160" y="3241503"/>
+            <a:off x="5661454" y="3059076"/>
             <a:ext cx="323336" cy="331572"/>
           </a:xfrm>
           <a:prstGeom prst="line">
@@ -12801,7 +12801,7 @@
         </p:nvCxnSpPr>
         <p:spPr>
           <a:xfrm flipH="1" flipV="1">
-            <a:off x="5704988" y="5113496"/>
+            <a:off x="2973487" y="5051891"/>
             <a:ext cx="597212" cy="331572"/>
           </a:xfrm>
           <a:prstGeom prst="line">
@@ -12846,7 +12846,7 @@
         </p:nvCxnSpPr>
         <p:spPr>
           <a:xfrm flipV="1">
-            <a:off x="5058317" y="5113496"/>
+            <a:off x="2326816" y="5051891"/>
             <a:ext cx="646671" cy="331572"/>
           </a:xfrm>
           <a:prstGeom prst="line">
@@ -12891,7 +12891,7 @@
         </p:nvCxnSpPr>
         <p:spPr>
           <a:xfrm flipH="1">
-            <a:off x="4733911" y="5667490"/>
+            <a:off x="2002410" y="5605885"/>
             <a:ext cx="324406" cy="331572"/>
           </a:xfrm>
           <a:prstGeom prst="line">
@@ -12936,7 +12936,7 @@
         </p:nvCxnSpPr>
         <p:spPr>
           <a:xfrm>
-            <a:off x="5058317" y="5667490"/>
+            <a:off x="2326816" y="5605885"/>
             <a:ext cx="322265" cy="331572"/>
           </a:xfrm>
           <a:prstGeom prst="line">
@@ -12981,7 +12981,7 @@
         </p:nvCxnSpPr>
         <p:spPr>
           <a:xfrm flipH="1">
-            <a:off x="5988106" y="5667490"/>
+            <a:off x="3256605" y="5605885"/>
             <a:ext cx="314094" cy="331572"/>
           </a:xfrm>
           <a:prstGeom prst="line">
@@ -13026,7 +13026,7 @@
         </p:nvCxnSpPr>
         <p:spPr>
           <a:xfrm>
-            <a:off x="6302200" y="5667490"/>
+            <a:off x="3570699" y="5605885"/>
             <a:ext cx="332577" cy="331572"/>
           </a:xfrm>
           <a:prstGeom prst="line">
@@ -13071,7 +13071,7 @@
         </p:nvCxnSpPr>
         <p:spPr>
           <a:xfrm flipV="1">
-            <a:off x="6304426" y="6221484"/>
+            <a:off x="3572925" y="6159879"/>
             <a:ext cx="330351" cy="348048"/>
           </a:xfrm>
           <a:prstGeom prst="line">
@@ -13116,7 +13116,7 @@
         </p:nvCxnSpPr>
         <p:spPr>
           <a:xfrm>
-            <a:off x="6634777" y="6221484"/>
+            <a:off x="3903276" y="6159879"/>
             <a:ext cx="316320" cy="348048"/>
           </a:xfrm>
           <a:prstGeom prst="line">
@@ -13157,7 +13157,7 @@
         </p:nvSpPr>
         <p:spPr>
           <a:xfrm>
-            <a:off x="2809486" y="2224296"/>
+            <a:off x="1966036" y="2126346"/>
             <a:ext cx="1373811" cy="461665"/>
           </a:xfrm>
           <a:prstGeom prst="rect">
@@ -13216,7 +13216,7 @@
         </p:nvCxnSpPr>
         <p:spPr>
           <a:xfrm flipH="1">
-            <a:off x="2472829" y="2455129"/>
+            <a:off x="1629379" y="2357179"/>
             <a:ext cx="336657" cy="0"/>
           </a:xfrm>
           <a:prstGeom prst="straightConnector1">
@@ -13258,7 +13258,7 @@
         </p:nvSpPr>
         <p:spPr>
           <a:xfrm>
-            <a:off x="9232219" y="2002207"/>
+            <a:off x="4866513" y="1819780"/>
             <a:ext cx="2236551" cy="276999"/>
           </a:xfrm>
           <a:prstGeom prst="rect">
@@ -13317,7 +13317,7 @@
         </p:nvCxnSpPr>
         <p:spPr>
           <a:xfrm>
-            <a:off x="10350495" y="2279206"/>
+            <a:off x="5984789" y="2096779"/>
             <a:ext cx="1" cy="181762"/>
           </a:xfrm>
           <a:prstGeom prst="straightConnector1">
@@ -13359,7 +13359,7 @@
         </p:nvSpPr>
         <p:spPr>
           <a:xfrm>
-            <a:off x="8175024" y="3045027"/>
+            <a:off x="3809318" y="2862600"/>
             <a:ext cx="1367131" cy="461665"/>
           </a:xfrm>
           <a:prstGeom prst="rect">
@@ -13418,7 +13418,7 @@
         </p:nvCxnSpPr>
         <p:spPr>
           <a:xfrm flipV="1">
-            <a:off x="9542155" y="3130292"/>
+            <a:off x="5176449" y="2947865"/>
             <a:ext cx="373794" cy="145568"/>
           </a:xfrm>
           <a:prstGeom prst="straightConnector1">
@@ -13460,7 +13460,7 @@
         </p:nvSpPr>
         <p:spPr>
           <a:xfrm>
-            <a:off x="2919984" y="5073195"/>
+            <a:off x="188483" y="5011590"/>
             <a:ext cx="1373810" cy="461665"/>
           </a:xfrm>
           <a:prstGeom prst="rect">
@@ -13515,7 +13515,7 @@
         </p:nvSpPr>
         <p:spPr>
           <a:xfrm>
-            <a:off x="4760101" y="4271639"/>
+            <a:off x="2028600" y="4210034"/>
             <a:ext cx="1893704" cy="276999"/>
           </a:xfrm>
           <a:prstGeom prst="rect">
@@ -13570,7 +13570,7 @@
         </p:nvSpPr>
         <p:spPr>
           <a:xfrm>
-            <a:off x="6894200" y="5047105"/>
+            <a:off x="3950768" y="5165499"/>
             <a:ext cx="1548209" cy="646331"/>
           </a:xfrm>
           <a:prstGeom prst="rect">
@@ -13625,7 +13625,7 @@
         </p:nvSpPr>
         <p:spPr>
           <a:xfrm>
-            <a:off x="7230129" y="5990651"/>
+            <a:off x="4346438" y="5910168"/>
             <a:ext cx="1367132" cy="276999"/>
           </a:xfrm>
           <a:prstGeom prst="rect">
@@ -13684,7 +13684,7 @@
         </p:nvCxnSpPr>
         <p:spPr>
           <a:xfrm>
-            <a:off x="4293794" y="5304028"/>
+            <a:off x="1562293" y="5242423"/>
             <a:ext cx="653312" cy="252251"/>
           </a:xfrm>
           <a:prstGeom prst="straightConnector1">
@@ -13730,7 +13730,7 @@
         </p:nvCxnSpPr>
         <p:spPr>
           <a:xfrm flipH="1">
-            <a:off x="5704988" y="4548638"/>
+            <a:off x="2973487" y="4487033"/>
             <a:ext cx="1965" cy="342436"/>
           </a:xfrm>
           <a:prstGeom prst="straightConnector1">
@@ -13776,8 +13776,8 @@
         </p:nvCxnSpPr>
         <p:spPr>
           <a:xfrm flipH="1">
-            <a:off x="6413410" y="5370271"/>
-            <a:ext cx="480790" cy="186008"/>
+            <a:off x="3681909" y="5488665"/>
+            <a:ext cx="268859" cy="6009"/>
           </a:xfrm>
           <a:prstGeom prst="straightConnector1">
             <a:avLst/>
@@ -13821,9 +13821,2606 @@
           <p:nvPr/>
         </p:nvCxnSpPr>
         <p:spPr>
+          <a:xfrm flipH="1">
+            <a:off x="4014486" y="6048668"/>
+            <a:ext cx="331952" cy="0"/>
+          </a:xfrm>
+          <a:prstGeom prst="straightConnector1">
+            <a:avLst/>
+          </a:prstGeom>
+          <a:ln w="38100">
+            <a:solidFill>
+              <a:schemeClr val="tx1"/>
+            </a:solidFill>
+            <a:tailEnd type="triangle"/>
+          </a:ln>
+        </p:spPr>
+        <p:style>
+          <a:lnRef idx="1">
+            <a:schemeClr val="accent1"/>
+          </a:lnRef>
+          <a:fillRef idx="0">
+            <a:schemeClr val="accent1"/>
+          </a:fillRef>
+          <a:effectRef idx="0">
+            <a:schemeClr val="accent1"/>
+          </a:effectRef>
+          <a:fontRef idx="minor">
+            <a:schemeClr val="tx1"/>
+          </a:fontRef>
+        </p:style>
+      </p:cxnSp>
+      <p:sp>
+        <p:nvSpPr>
+          <p:cNvPr id="55" name="Oval 54">
+            <a:extLst>
+              <a:ext uri="{FF2B5EF4-FFF2-40B4-BE49-F238E27FC236}">
+                <a16:creationId xmlns:a16="http://schemas.microsoft.com/office/drawing/2014/main" id="{02AA57D3-A26A-420D-A0D9-DE80F42F2E03}"/>
+              </a:ext>
+            </a:extLst>
+          </p:cNvPr>
+          <p:cNvSpPr/>
+          <p:nvPr/>
+        </p:nvSpPr>
+        <p:spPr>
+          <a:xfrm>
+            <a:off x="9216299" y="2332216"/>
+            <a:ext cx="222421" cy="222422"/>
+          </a:xfrm>
+          <a:prstGeom prst="ellipse">
+            <a:avLst/>
+          </a:prstGeom>
+          <a:ln>
+            <a:noFill/>
+          </a:ln>
+        </p:spPr>
+        <p:style>
+          <a:lnRef idx="2">
+            <a:schemeClr val="accent1">
+              <a:shade val="50000"/>
+            </a:schemeClr>
+          </a:lnRef>
+          <a:fillRef idx="1">
+            <a:schemeClr val="accent1"/>
+          </a:fillRef>
+          <a:effectRef idx="0">
+            <a:schemeClr val="accent1"/>
+          </a:effectRef>
+          <a:fontRef idx="minor">
+            <a:schemeClr val="lt1"/>
+          </a:fontRef>
+        </p:style>
+        <p:txBody>
+          <a:bodyPr rtlCol="0" anchor="ctr"/>
+          <a:lstStyle/>
+          <a:p>
+            <a:pPr algn="ctr"/>
+            <a:endParaRPr lang="en-US" dirty="0"/>
+          </a:p>
+        </p:txBody>
+      </p:sp>
+      <p:sp>
+        <p:nvSpPr>
+          <p:cNvPr id="61" name="Oval 60">
+            <a:extLst>
+              <a:ext uri="{FF2B5EF4-FFF2-40B4-BE49-F238E27FC236}">
+                <a16:creationId xmlns:a16="http://schemas.microsoft.com/office/drawing/2014/main" id="{D89AE305-3CA7-4BF3-8290-DF6A43A764EE}"/>
+              </a:ext>
+            </a:extLst>
+          </p:cNvPr>
+          <p:cNvSpPr/>
+          <p:nvPr/>
+        </p:nvSpPr>
+        <p:spPr>
+          <a:xfrm>
+            <a:off x="8569628" y="2886210"/>
+            <a:ext cx="222421" cy="222422"/>
+          </a:xfrm>
+          <a:prstGeom prst="ellipse">
+            <a:avLst/>
+          </a:prstGeom>
+          <a:ln>
+            <a:noFill/>
+          </a:ln>
+        </p:spPr>
+        <p:style>
+          <a:lnRef idx="2">
+            <a:schemeClr val="accent1">
+              <a:shade val="50000"/>
+            </a:schemeClr>
+          </a:lnRef>
+          <a:fillRef idx="1">
+            <a:schemeClr val="accent1"/>
+          </a:fillRef>
+          <a:effectRef idx="0">
+            <a:schemeClr val="accent1"/>
+          </a:effectRef>
+          <a:fontRef idx="minor">
+            <a:schemeClr val="lt1"/>
+          </a:fontRef>
+        </p:style>
+        <p:txBody>
+          <a:bodyPr rtlCol="0" anchor="ctr"/>
+          <a:lstStyle/>
+          <a:p>
+            <a:pPr algn="ctr"/>
+            <a:endParaRPr lang="en-US"/>
+          </a:p>
+        </p:txBody>
+      </p:sp>
+      <p:sp>
+        <p:nvSpPr>
+          <p:cNvPr id="62" name="Oval 61">
+            <a:extLst>
+              <a:ext uri="{FF2B5EF4-FFF2-40B4-BE49-F238E27FC236}">
+                <a16:creationId xmlns:a16="http://schemas.microsoft.com/office/drawing/2014/main" id="{2A1F312B-0D24-46EF-81C5-6959AED58A5C}"/>
+              </a:ext>
+            </a:extLst>
+          </p:cNvPr>
+          <p:cNvSpPr/>
+          <p:nvPr/>
+        </p:nvSpPr>
+        <p:spPr>
+          <a:xfrm>
+            <a:off x="9813511" y="2886210"/>
+            <a:ext cx="222421" cy="222422"/>
+          </a:xfrm>
+          <a:prstGeom prst="ellipse">
+            <a:avLst/>
+          </a:prstGeom>
+          <a:ln>
+            <a:noFill/>
+          </a:ln>
+        </p:spPr>
+        <p:style>
+          <a:lnRef idx="2">
+            <a:schemeClr val="accent1">
+              <a:shade val="50000"/>
+            </a:schemeClr>
+          </a:lnRef>
+          <a:fillRef idx="1">
+            <a:schemeClr val="accent1"/>
+          </a:fillRef>
+          <a:effectRef idx="0">
+            <a:schemeClr val="accent1"/>
+          </a:effectRef>
+          <a:fontRef idx="minor">
+            <a:schemeClr val="lt1"/>
+          </a:fontRef>
+        </p:style>
+        <p:txBody>
+          <a:bodyPr rtlCol="0" anchor="ctr"/>
+          <a:lstStyle/>
+          <a:p>
+            <a:pPr algn="ctr"/>
+            <a:endParaRPr lang="en-US"/>
+          </a:p>
+        </p:txBody>
+      </p:sp>
+      <p:sp>
+        <p:nvSpPr>
+          <p:cNvPr id="64" name="Oval 63">
+            <a:extLst>
+              <a:ext uri="{FF2B5EF4-FFF2-40B4-BE49-F238E27FC236}">
+                <a16:creationId xmlns:a16="http://schemas.microsoft.com/office/drawing/2014/main" id="{72146E82-1359-450C-8713-8F03D84719D3}"/>
+              </a:ext>
+            </a:extLst>
+          </p:cNvPr>
+          <p:cNvSpPr/>
+          <p:nvPr/>
+        </p:nvSpPr>
+        <p:spPr>
+          <a:xfrm>
+            <a:off x="8245222" y="3440204"/>
+            <a:ext cx="222421" cy="222422"/>
+          </a:xfrm>
+          <a:prstGeom prst="ellipse">
+            <a:avLst/>
+          </a:prstGeom>
+          <a:solidFill>
+            <a:srgbClr val="7030A0"/>
+          </a:solidFill>
+          <a:ln>
+            <a:noFill/>
+          </a:ln>
+        </p:spPr>
+        <p:style>
+          <a:lnRef idx="2">
+            <a:schemeClr val="accent1">
+              <a:shade val="50000"/>
+            </a:schemeClr>
+          </a:lnRef>
+          <a:fillRef idx="1">
+            <a:schemeClr val="accent1"/>
+          </a:fillRef>
+          <a:effectRef idx="0">
+            <a:schemeClr val="accent1"/>
+          </a:effectRef>
+          <a:fontRef idx="minor">
+            <a:schemeClr val="lt1"/>
+          </a:fontRef>
+        </p:style>
+        <p:txBody>
+          <a:bodyPr rtlCol="0" anchor="ctr"/>
+          <a:lstStyle/>
+          <a:p>
+            <a:pPr algn="ctr"/>
+            <a:endParaRPr lang="en-US"/>
+          </a:p>
+        </p:txBody>
+      </p:sp>
+      <p:sp>
+        <p:nvSpPr>
+          <p:cNvPr id="65" name="Oval 64">
+            <a:extLst>
+              <a:ext uri="{FF2B5EF4-FFF2-40B4-BE49-F238E27FC236}">
+                <a16:creationId xmlns:a16="http://schemas.microsoft.com/office/drawing/2014/main" id="{B00D2C81-67EF-4A4A-A4B6-9976F5AB41DE}"/>
+              </a:ext>
+            </a:extLst>
+          </p:cNvPr>
+          <p:cNvSpPr/>
+          <p:nvPr/>
+        </p:nvSpPr>
+        <p:spPr>
+          <a:xfrm>
+            <a:off x="8891893" y="3440204"/>
+            <a:ext cx="222421" cy="222422"/>
+          </a:xfrm>
+          <a:prstGeom prst="ellipse">
+            <a:avLst/>
+          </a:prstGeom>
+          <a:solidFill>
+            <a:srgbClr val="FF0000"/>
+          </a:solidFill>
+          <a:ln>
+            <a:noFill/>
+          </a:ln>
+        </p:spPr>
+        <p:style>
+          <a:lnRef idx="2">
+            <a:schemeClr val="accent1">
+              <a:shade val="50000"/>
+            </a:schemeClr>
+          </a:lnRef>
+          <a:fillRef idx="1">
+            <a:schemeClr val="accent1"/>
+          </a:fillRef>
+          <a:effectRef idx="0">
+            <a:schemeClr val="accent1"/>
+          </a:effectRef>
+          <a:fontRef idx="minor">
+            <a:schemeClr val="lt1"/>
+          </a:fontRef>
+        </p:style>
+        <p:txBody>
+          <a:bodyPr rtlCol="0" anchor="ctr"/>
+          <a:lstStyle/>
+          <a:p>
+            <a:pPr algn="ctr"/>
+            <a:endParaRPr lang="en-US"/>
+          </a:p>
+        </p:txBody>
+      </p:sp>
+      <p:sp>
+        <p:nvSpPr>
+          <p:cNvPr id="66" name="Oval 65">
+            <a:extLst>
+              <a:ext uri="{FF2B5EF4-FFF2-40B4-BE49-F238E27FC236}">
+                <a16:creationId xmlns:a16="http://schemas.microsoft.com/office/drawing/2014/main" id="{B6462B10-BDF7-4245-96D3-D22911CE7BCC}"/>
+              </a:ext>
+            </a:extLst>
+          </p:cNvPr>
+          <p:cNvSpPr/>
+          <p:nvPr/>
+        </p:nvSpPr>
+        <p:spPr>
+          <a:xfrm>
+            <a:off x="9499417" y="3440204"/>
+            <a:ext cx="222421" cy="222422"/>
+          </a:xfrm>
+          <a:prstGeom prst="ellipse">
+            <a:avLst/>
+          </a:prstGeom>
+          <a:solidFill>
+            <a:srgbClr val="7030A0"/>
+          </a:solidFill>
+          <a:ln>
+            <a:noFill/>
+          </a:ln>
+        </p:spPr>
+        <p:style>
+          <a:lnRef idx="2">
+            <a:schemeClr val="accent1">
+              <a:shade val="50000"/>
+            </a:schemeClr>
+          </a:lnRef>
+          <a:fillRef idx="1">
+            <a:schemeClr val="accent1"/>
+          </a:fillRef>
+          <a:effectRef idx="0">
+            <a:schemeClr val="accent1"/>
+          </a:effectRef>
+          <a:fontRef idx="minor">
+            <a:schemeClr val="lt1"/>
+          </a:fontRef>
+        </p:style>
+        <p:txBody>
+          <a:bodyPr rtlCol="0" anchor="ctr"/>
+          <a:lstStyle/>
+          <a:p>
+            <a:pPr algn="ctr"/>
+            <a:endParaRPr lang="en-US"/>
+          </a:p>
+        </p:txBody>
+      </p:sp>
+      <p:sp>
+        <p:nvSpPr>
+          <p:cNvPr id="68" name="Oval 67">
+            <a:extLst>
+              <a:ext uri="{FF2B5EF4-FFF2-40B4-BE49-F238E27FC236}">
+                <a16:creationId xmlns:a16="http://schemas.microsoft.com/office/drawing/2014/main" id="{EE993BA7-D0FD-46AB-9BAF-9FBE00D40624}"/>
+              </a:ext>
+            </a:extLst>
+          </p:cNvPr>
+          <p:cNvSpPr/>
+          <p:nvPr/>
+        </p:nvSpPr>
+        <p:spPr>
+          <a:xfrm>
+            <a:off x="10146088" y="3440204"/>
+            <a:ext cx="222421" cy="222422"/>
+          </a:xfrm>
+          <a:prstGeom prst="ellipse">
+            <a:avLst/>
+          </a:prstGeom>
+          <a:solidFill>
+            <a:srgbClr val="FF0000"/>
+          </a:solidFill>
+          <a:ln>
+            <a:noFill/>
+          </a:ln>
+        </p:spPr>
+        <p:style>
+          <a:lnRef idx="2">
+            <a:schemeClr val="accent1">
+              <a:shade val="50000"/>
+            </a:schemeClr>
+          </a:lnRef>
+          <a:fillRef idx="1">
+            <a:schemeClr val="accent1"/>
+          </a:fillRef>
+          <a:effectRef idx="0">
+            <a:schemeClr val="accent1"/>
+          </a:effectRef>
+          <a:fontRef idx="minor">
+            <a:schemeClr val="lt1"/>
+          </a:fontRef>
+        </p:style>
+        <p:txBody>
+          <a:bodyPr rtlCol="0" anchor="ctr"/>
+          <a:lstStyle/>
+          <a:p>
+            <a:pPr algn="ctr"/>
+            <a:endParaRPr lang="en-US"/>
+          </a:p>
+        </p:txBody>
+      </p:sp>
+      <p:cxnSp>
+        <p:nvCxnSpPr>
+          <p:cNvPr id="69" name="Straight Connector 68">
+            <a:extLst>
+              <a:ext uri="{FF2B5EF4-FFF2-40B4-BE49-F238E27FC236}">
+                <a16:creationId xmlns:a16="http://schemas.microsoft.com/office/drawing/2014/main" id="{F882E183-02AC-4C2C-B35A-B542E4141C79}"/>
+              </a:ext>
+            </a:extLst>
+          </p:cNvPr>
+          <p:cNvCxnSpPr>
+            <a:cxnSpLocks/>
+            <a:stCxn id="55" idx="4"/>
+            <a:endCxn id="61" idx="0"/>
+          </p:cNvCxnSpPr>
+          <p:nvPr/>
+        </p:nvCxnSpPr>
+        <p:spPr>
+          <a:xfrm flipH="1">
+            <a:off x="8680839" y="2554638"/>
+            <a:ext cx="646671" cy="331572"/>
+          </a:xfrm>
+          <a:prstGeom prst="line">
+            <a:avLst/>
+          </a:prstGeom>
+          <a:ln w="38100">
+            <a:solidFill>
+              <a:schemeClr val="tx1"/>
+            </a:solidFill>
+          </a:ln>
+        </p:spPr>
+        <p:style>
+          <a:lnRef idx="1">
+            <a:schemeClr val="accent1"/>
+          </a:lnRef>
+          <a:fillRef idx="0">
+            <a:schemeClr val="accent1"/>
+          </a:fillRef>
+          <a:effectRef idx="0">
+            <a:schemeClr val="accent1"/>
+          </a:effectRef>
+          <a:fontRef idx="minor">
+            <a:schemeClr val="tx1"/>
+          </a:fontRef>
+        </p:style>
+      </p:cxnSp>
+      <p:cxnSp>
+        <p:nvCxnSpPr>
+          <p:cNvPr id="71" name="Straight Connector 70">
+            <a:extLst>
+              <a:ext uri="{FF2B5EF4-FFF2-40B4-BE49-F238E27FC236}">
+                <a16:creationId xmlns:a16="http://schemas.microsoft.com/office/drawing/2014/main" id="{6012CD2F-FCC3-4566-8AF0-56D908A8029C}"/>
+              </a:ext>
+            </a:extLst>
+          </p:cNvPr>
+          <p:cNvCxnSpPr>
+            <a:cxnSpLocks/>
+            <a:stCxn id="55" idx="4"/>
+            <a:endCxn id="62" idx="0"/>
+          </p:cNvCxnSpPr>
+          <p:nvPr/>
+        </p:nvCxnSpPr>
+        <p:spPr>
+          <a:xfrm>
+            <a:off x="9327510" y="2554638"/>
+            <a:ext cx="597212" cy="331572"/>
+          </a:xfrm>
+          <a:prstGeom prst="line">
+            <a:avLst/>
+          </a:prstGeom>
+          <a:ln w="38100">
+            <a:solidFill>
+              <a:schemeClr val="tx1"/>
+            </a:solidFill>
+          </a:ln>
+        </p:spPr>
+        <p:style>
+          <a:lnRef idx="1">
+            <a:schemeClr val="accent1"/>
+          </a:lnRef>
+          <a:fillRef idx="0">
+            <a:schemeClr val="accent1"/>
+          </a:fillRef>
+          <a:effectRef idx="0">
+            <a:schemeClr val="accent1"/>
+          </a:effectRef>
+          <a:fontRef idx="minor">
+            <a:schemeClr val="tx1"/>
+          </a:fontRef>
+        </p:style>
+      </p:cxnSp>
+      <p:cxnSp>
+        <p:nvCxnSpPr>
+          <p:cNvPr id="72" name="Straight Connector 71">
+            <a:extLst>
+              <a:ext uri="{FF2B5EF4-FFF2-40B4-BE49-F238E27FC236}">
+                <a16:creationId xmlns:a16="http://schemas.microsoft.com/office/drawing/2014/main" id="{9BAE87B6-26E6-42A1-8BB6-48C88AC091BE}"/>
+              </a:ext>
+            </a:extLst>
+          </p:cNvPr>
+          <p:cNvCxnSpPr>
+            <a:cxnSpLocks/>
+            <a:stCxn id="64" idx="0"/>
+            <a:endCxn id="61" idx="4"/>
+          </p:cNvCxnSpPr>
+          <p:nvPr/>
+        </p:nvCxnSpPr>
+        <p:spPr>
+          <a:xfrm flipV="1">
+            <a:off x="8356433" y="3108632"/>
+            <a:ext cx="324406" cy="331572"/>
+          </a:xfrm>
+          <a:prstGeom prst="line">
+            <a:avLst/>
+          </a:prstGeom>
+          <a:ln w="38100">
+            <a:solidFill>
+              <a:schemeClr val="tx1"/>
+            </a:solidFill>
+          </a:ln>
+        </p:spPr>
+        <p:style>
+          <a:lnRef idx="1">
+            <a:schemeClr val="accent1"/>
+          </a:lnRef>
+          <a:fillRef idx="0">
+            <a:schemeClr val="accent1"/>
+          </a:fillRef>
+          <a:effectRef idx="0">
+            <a:schemeClr val="accent1"/>
+          </a:effectRef>
+          <a:fontRef idx="minor">
+            <a:schemeClr val="tx1"/>
+          </a:fontRef>
+        </p:style>
+      </p:cxnSp>
+      <p:cxnSp>
+        <p:nvCxnSpPr>
+          <p:cNvPr id="74" name="Straight Connector 73">
+            <a:extLst>
+              <a:ext uri="{FF2B5EF4-FFF2-40B4-BE49-F238E27FC236}">
+                <a16:creationId xmlns:a16="http://schemas.microsoft.com/office/drawing/2014/main" id="{15D6DD88-2D48-4EB6-82C1-F82BE15B4772}"/>
+              </a:ext>
+            </a:extLst>
+          </p:cNvPr>
+          <p:cNvCxnSpPr>
+            <a:cxnSpLocks/>
+            <a:stCxn id="65" idx="0"/>
+            <a:endCxn id="61" idx="4"/>
+          </p:cNvCxnSpPr>
+          <p:nvPr/>
+        </p:nvCxnSpPr>
+        <p:spPr>
           <a:xfrm flipH="1" flipV="1">
-            <a:off x="6745987" y="6110273"/>
-            <a:ext cx="484142" cy="18878"/>
+            <a:off x="8680839" y="3108632"/>
+            <a:ext cx="322265" cy="331572"/>
+          </a:xfrm>
+          <a:prstGeom prst="line">
+            <a:avLst/>
+          </a:prstGeom>
+          <a:ln w="38100">
+            <a:solidFill>
+              <a:schemeClr val="tx1"/>
+            </a:solidFill>
+          </a:ln>
+        </p:spPr>
+        <p:style>
+          <a:lnRef idx="1">
+            <a:schemeClr val="accent1"/>
+          </a:lnRef>
+          <a:fillRef idx="0">
+            <a:schemeClr val="accent1"/>
+          </a:fillRef>
+          <a:effectRef idx="0">
+            <a:schemeClr val="accent1"/>
+          </a:effectRef>
+          <a:fontRef idx="minor">
+            <a:schemeClr val="tx1"/>
+          </a:fontRef>
+        </p:style>
+      </p:cxnSp>
+      <p:cxnSp>
+        <p:nvCxnSpPr>
+          <p:cNvPr id="76" name="Straight Connector 75">
+            <a:extLst>
+              <a:ext uri="{FF2B5EF4-FFF2-40B4-BE49-F238E27FC236}">
+                <a16:creationId xmlns:a16="http://schemas.microsoft.com/office/drawing/2014/main" id="{0B96EB33-0998-4B64-BED7-1A9EE02AB5E6}"/>
+              </a:ext>
+            </a:extLst>
+          </p:cNvPr>
+          <p:cNvCxnSpPr>
+            <a:cxnSpLocks/>
+            <a:stCxn id="66" idx="0"/>
+            <a:endCxn id="62" idx="4"/>
+          </p:cNvCxnSpPr>
+          <p:nvPr/>
+        </p:nvCxnSpPr>
+        <p:spPr>
+          <a:xfrm flipV="1">
+            <a:off x="9610628" y="3108632"/>
+            <a:ext cx="314094" cy="331572"/>
+          </a:xfrm>
+          <a:prstGeom prst="line">
+            <a:avLst/>
+          </a:prstGeom>
+          <a:ln w="38100">
+            <a:solidFill>
+              <a:schemeClr val="tx1"/>
+            </a:solidFill>
+          </a:ln>
+        </p:spPr>
+        <p:style>
+          <a:lnRef idx="1">
+            <a:schemeClr val="accent1"/>
+          </a:lnRef>
+          <a:fillRef idx="0">
+            <a:schemeClr val="accent1"/>
+          </a:fillRef>
+          <a:effectRef idx="0">
+            <a:schemeClr val="accent1"/>
+          </a:effectRef>
+          <a:fontRef idx="minor">
+            <a:schemeClr val="tx1"/>
+          </a:fontRef>
+        </p:style>
+      </p:cxnSp>
+      <p:cxnSp>
+        <p:nvCxnSpPr>
+          <p:cNvPr id="77" name="Straight Connector 76">
+            <a:extLst>
+              <a:ext uri="{FF2B5EF4-FFF2-40B4-BE49-F238E27FC236}">
+                <a16:creationId xmlns:a16="http://schemas.microsoft.com/office/drawing/2014/main" id="{8F253D87-F564-4AE4-9FA1-6CA121874F3A}"/>
+              </a:ext>
+            </a:extLst>
+          </p:cNvPr>
+          <p:cNvCxnSpPr>
+            <a:cxnSpLocks/>
+            <a:stCxn id="68" idx="0"/>
+            <a:endCxn id="62" idx="4"/>
+          </p:cNvCxnSpPr>
+          <p:nvPr/>
+        </p:nvCxnSpPr>
+        <p:spPr>
+          <a:xfrm flipH="1" flipV="1">
+            <a:off x="9924722" y="3108632"/>
+            <a:ext cx="332577" cy="331572"/>
+          </a:xfrm>
+          <a:prstGeom prst="line">
+            <a:avLst/>
+          </a:prstGeom>
+          <a:ln w="38100">
+            <a:solidFill>
+              <a:schemeClr val="tx1"/>
+            </a:solidFill>
+          </a:ln>
+        </p:spPr>
+        <p:style>
+          <a:lnRef idx="1">
+            <a:schemeClr val="accent1"/>
+          </a:lnRef>
+          <a:fillRef idx="0">
+            <a:schemeClr val="accent1"/>
+          </a:fillRef>
+          <a:effectRef idx="0">
+            <a:schemeClr val="accent1"/>
+          </a:effectRef>
+          <a:fontRef idx="minor">
+            <a:schemeClr val="tx1"/>
+          </a:fontRef>
+        </p:style>
+      </p:cxnSp>
+      <p:sp>
+        <p:nvSpPr>
+          <p:cNvPr id="78" name="Flowchart: Off-page Connector 77">
+            <a:extLst>
+              <a:ext uri="{FF2B5EF4-FFF2-40B4-BE49-F238E27FC236}">
+                <a16:creationId xmlns:a16="http://schemas.microsoft.com/office/drawing/2014/main" id="{888411F1-30DE-4A36-AF05-3035F6CF3581}"/>
+              </a:ext>
+            </a:extLst>
+          </p:cNvPr>
+          <p:cNvSpPr/>
+          <p:nvPr/>
+        </p:nvSpPr>
+        <p:spPr>
+          <a:xfrm>
+            <a:off x="8401275" y="2292446"/>
+            <a:ext cx="222421" cy="331572"/>
+          </a:xfrm>
+          <a:prstGeom prst="flowChartOffpageConnector">
+            <a:avLst/>
+          </a:prstGeom>
+          <a:solidFill>
+            <a:schemeClr val="accent6">
+              <a:lumMod val="40000"/>
+              <a:lumOff val="60000"/>
+            </a:schemeClr>
+          </a:solidFill>
+          <a:ln w="25400"/>
+        </p:spPr>
+        <p:style>
+          <a:lnRef idx="2">
+            <a:schemeClr val="dk1"/>
+          </a:lnRef>
+          <a:fillRef idx="1">
+            <a:schemeClr val="lt1"/>
+          </a:fillRef>
+          <a:effectRef idx="0">
+            <a:schemeClr val="dk1"/>
+          </a:effectRef>
+          <a:fontRef idx="minor">
+            <a:schemeClr val="dk1"/>
+          </a:fontRef>
+        </p:style>
+        <p:txBody>
+          <a:bodyPr rtlCol="0" anchor="ctr"/>
+          <a:lstStyle/>
+          <a:p>
+            <a:pPr algn="ctr"/>
+            <a:r>
+              <a:rPr lang="en-US" dirty="0"/>
+              <a:t>3</a:t>
+            </a:r>
+          </a:p>
+        </p:txBody>
+      </p:sp>
+      <p:sp>
+        <p:nvSpPr>
+          <p:cNvPr id="79" name="TextBox 78">
+            <a:extLst>
+              <a:ext uri="{FF2B5EF4-FFF2-40B4-BE49-F238E27FC236}">
+                <a16:creationId xmlns:a16="http://schemas.microsoft.com/office/drawing/2014/main" id="{93E4C751-F821-4329-9FD4-ADC809513C51}"/>
+              </a:ext>
+            </a:extLst>
+          </p:cNvPr>
+          <p:cNvSpPr txBox="1"/>
+          <p:nvPr/>
+        </p:nvSpPr>
+        <p:spPr>
+          <a:xfrm>
+            <a:off x="8394245" y="1738851"/>
+            <a:ext cx="1860741" cy="461665"/>
+          </a:xfrm>
+          <a:prstGeom prst="rect">
+            <a:avLst/>
+          </a:prstGeom>
+        </p:spPr>
+        <p:style>
+          <a:lnRef idx="2">
+            <a:schemeClr val="accent1"/>
+          </a:lnRef>
+          <a:fillRef idx="1">
+            <a:schemeClr val="lt1"/>
+          </a:fillRef>
+          <a:effectRef idx="0">
+            <a:schemeClr val="accent1"/>
+          </a:effectRef>
+          <a:fontRef idx="minor">
+            <a:schemeClr val="dk1"/>
+          </a:fontRef>
+        </p:style>
+        <p:txBody>
+          <a:bodyPr wrap="square" rtlCol="0">
+            <a:spAutoFit/>
+          </a:bodyPr>
+          <a:lstStyle/>
+          <a:p>
+            <a:pPr algn="ctr"/>
+            <a:r>
+              <a:rPr lang="en-US" sz="1200" dirty="0">
+                <a:solidFill>
+                  <a:schemeClr val="accent1">
+                    <a:lumMod val="75000"/>
+                  </a:schemeClr>
+                </a:solidFill>
+              </a:rPr>
+              <a:t>1 AP Test Percent 0-33% </a:t>
+            </a:r>
+          </a:p>
+          <a:p>
+            <a:pPr algn="ctr"/>
+            <a:r>
+              <a:rPr lang="en-US" sz="1200" dirty="0">
+                <a:solidFill>
+                  <a:schemeClr val="accent1">
+                    <a:lumMod val="75000"/>
+                  </a:schemeClr>
+                </a:solidFill>
+              </a:rPr>
+              <a:t>1 AP Test Percent 66-100%  </a:t>
+            </a:r>
+          </a:p>
+        </p:txBody>
+      </p:sp>
+      <p:sp>
+        <p:nvSpPr>
+          <p:cNvPr id="80" name="TextBox 79">
+            <a:extLst>
+              <a:ext uri="{FF2B5EF4-FFF2-40B4-BE49-F238E27FC236}">
+                <a16:creationId xmlns:a16="http://schemas.microsoft.com/office/drawing/2014/main" id="{67C85EFD-0F48-4479-A82C-271FA36DFD9E}"/>
+              </a:ext>
+            </a:extLst>
+          </p:cNvPr>
+          <p:cNvSpPr txBox="1"/>
+          <p:nvPr/>
+        </p:nvSpPr>
+        <p:spPr>
+          <a:xfrm>
+            <a:off x="6374452" y="5276972"/>
+            <a:ext cx="1951683" cy="461665"/>
+          </a:xfrm>
+          <a:prstGeom prst="rect">
+            <a:avLst/>
+          </a:prstGeom>
+        </p:spPr>
+        <p:style>
+          <a:lnRef idx="2">
+            <a:schemeClr val="accent1"/>
+          </a:lnRef>
+          <a:fillRef idx="1">
+            <a:schemeClr val="lt1"/>
+          </a:fillRef>
+          <a:effectRef idx="0">
+            <a:schemeClr val="accent1"/>
+          </a:effectRef>
+          <a:fontRef idx="minor">
+            <a:schemeClr val="dk1"/>
+          </a:fontRef>
+        </p:style>
+        <p:txBody>
+          <a:bodyPr wrap="square" rtlCol="0">
+            <a:spAutoFit/>
+          </a:bodyPr>
+          <a:lstStyle/>
+          <a:p>
+            <a:pPr algn="ctr"/>
+            <a:r>
+              <a:rPr lang="en-US" sz="1200" dirty="0">
+                <a:solidFill>
+                  <a:schemeClr val="accent1">
+                    <a:lumMod val="75000"/>
+                  </a:schemeClr>
+                </a:solidFill>
+              </a:rPr>
+              <a:t>1 AP Test Percent 33-66% </a:t>
+            </a:r>
+          </a:p>
+          <a:p>
+            <a:pPr algn="ctr"/>
+            <a:r>
+              <a:rPr lang="en-US" sz="1200" dirty="0">
+                <a:solidFill>
+                  <a:schemeClr val="accent1">
+                    <a:lumMod val="75000"/>
+                  </a:schemeClr>
+                </a:solidFill>
+              </a:rPr>
+              <a:t>1 AP Test Percent 66-100%  </a:t>
+            </a:r>
+          </a:p>
+        </p:txBody>
+      </p:sp>
+      <p:sp>
+        <p:nvSpPr>
+          <p:cNvPr id="81" name="TextBox 80">
+            <a:extLst>
+              <a:ext uri="{FF2B5EF4-FFF2-40B4-BE49-F238E27FC236}">
+                <a16:creationId xmlns:a16="http://schemas.microsoft.com/office/drawing/2014/main" id="{5BA406C1-38CE-40AF-96AA-1524B5FDD00F}"/>
+              </a:ext>
+            </a:extLst>
+          </p:cNvPr>
+          <p:cNvSpPr txBox="1"/>
+          <p:nvPr/>
+        </p:nvSpPr>
+        <p:spPr>
+          <a:xfrm>
+            <a:off x="7006252" y="2581393"/>
+            <a:ext cx="1373811" cy="461665"/>
+          </a:xfrm>
+          <a:prstGeom prst="rect">
+            <a:avLst/>
+          </a:prstGeom>
+        </p:spPr>
+        <p:style>
+          <a:lnRef idx="2">
+            <a:schemeClr val="accent1"/>
+          </a:lnRef>
+          <a:fillRef idx="1">
+            <a:schemeClr val="lt1"/>
+          </a:fillRef>
+          <a:effectRef idx="0">
+            <a:schemeClr val="accent1"/>
+          </a:effectRef>
+          <a:fontRef idx="minor">
+            <a:schemeClr val="dk1"/>
+          </a:fontRef>
+        </p:style>
+        <p:txBody>
+          <a:bodyPr wrap="square" rtlCol="0">
+            <a:spAutoFit/>
+          </a:bodyPr>
+          <a:lstStyle/>
+          <a:p>
+            <a:pPr algn="ctr"/>
+            <a:r>
+              <a:rPr lang="en-US" sz="1200" dirty="0">
+                <a:solidFill>
+                  <a:schemeClr val="accent1">
+                    <a:lumMod val="75000"/>
+                  </a:schemeClr>
+                </a:solidFill>
+              </a:rPr>
+              <a:t>2 AP Test 33-66%, 2 AP Test 66-100%</a:t>
+            </a:r>
+          </a:p>
+        </p:txBody>
+      </p:sp>
+      <p:sp>
+        <p:nvSpPr>
+          <p:cNvPr id="82" name="TextBox 81">
+            <a:extLst>
+              <a:ext uri="{FF2B5EF4-FFF2-40B4-BE49-F238E27FC236}">
+                <a16:creationId xmlns:a16="http://schemas.microsoft.com/office/drawing/2014/main" id="{45EDB4FE-D514-4A58-B302-1CF350B6C93D}"/>
+              </a:ext>
+            </a:extLst>
+          </p:cNvPr>
+          <p:cNvSpPr txBox="1"/>
+          <p:nvPr/>
+        </p:nvSpPr>
+        <p:spPr>
+          <a:xfrm>
+            <a:off x="10146088" y="2322510"/>
+            <a:ext cx="1993919" cy="461665"/>
+          </a:xfrm>
+          <a:prstGeom prst="rect">
+            <a:avLst/>
+          </a:prstGeom>
+        </p:spPr>
+        <p:style>
+          <a:lnRef idx="2">
+            <a:schemeClr val="accent1"/>
+          </a:lnRef>
+          <a:fillRef idx="1">
+            <a:schemeClr val="lt1"/>
+          </a:fillRef>
+          <a:effectRef idx="0">
+            <a:schemeClr val="accent1"/>
+          </a:effectRef>
+          <a:fontRef idx="minor">
+            <a:schemeClr val="dk1"/>
+          </a:fontRef>
+        </p:style>
+        <p:txBody>
+          <a:bodyPr wrap="square" rtlCol="0">
+            <a:spAutoFit/>
+          </a:bodyPr>
+          <a:lstStyle/>
+          <a:p>
+            <a:pPr algn="ctr"/>
+            <a:r>
+              <a:rPr lang="en-US" sz="1200" dirty="0">
+                <a:solidFill>
+                  <a:schemeClr val="accent1">
+                    <a:lumMod val="75000"/>
+                  </a:schemeClr>
+                </a:solidFill>
+              </a:rPr>
+              <a:t>Total Enrollment 500-1000</a:t>
+            </a:r>
+          </a:p>
+          <a:p>
+            <a:pPr algn="ctr"/>
+            <a:r>
+              <a:rPr lang="en-US" sz="1200" dirty="0">
+                <a:solidFill>
+                  <a:schemeClr val="accent1">
+                    <a:lumMod val="75000"/>
+                  </a:schemeClr>
+                </a:solidFill>
+              </a:rPr>
+              <a:t>Total Enrollment 1500-2000</a:t>
+            </a:r>
+          </a:p>
+        </p:txBody>
+      </p:sp>
+      <p:cxnSp>
+        <p:nvCxnSpPr>
+          <p:cNvPr id="89" name="Straight Arrow Connector 88">
+            <a:extLst>
+              <a:ext uri="{FF2B5EF4-FFF2-40B4-BE49-F238E27FC236}">
+                <a16:creationId xmlns:a16="http://schemas.microsoft.com/office/drawing/2014/main" id="{2080A632-0404-4BC0-964D-E7C572CC4A43}"/>
+              </a:ext>
+            </a:extLst>
+          </p:cNvPr>
+          <p:cNvCxnSpPr>
+            <a:cxnSpLocks/>
+            <a:stCxn id="81" idx="3"/>
+            <a:endCxn id="61" idx="2"/>
+          </p:cNvCxnSpPr>
+          <p:nvPr/>
+        </p:nvCxnSpPr>
+        <p:spPr>
+          <a:xfrm>
+            <a:off x="8380063" y="2812226"/>
+            <a:ext cx="189565" cy="185195"/>
+          </a:xfrm>
+          <a:prstGeom prst="straightConnector1">
+            <a:avLst/>
+          </a:prstGeom>
+          <a:ln w="38100">
+            <a:solidFill>
+              <a:schemeClr val="tx1"/>
+            </a:solidFill>
+            <a:tailEnd type="triangle"/>
+          </a:ln>
+        </p:spPr>
+        <p:style>
+          <a:lnRef idx="1">
+            <a:schemeClr val="accent1"/>
+          </a:lnRef>
+          <a:fillRef idx="0">
+            <a:schemeClr val="accent1"/>
+          </a:fillRef>
+          <a:effectRef idx="0">
+            <a:schemeClr val="accent1"/>
+          </a:effectRef>
+          <a:fontRef idx="minor">
+            <a:schemeClr val="tx1"/>
+          </a:fontRef>
+        </p:style>
+      </p:cxnSp>
+      <p:cxnSp>
+        <p:nvCxnSpPr>
+          <p:cNvPr id="93" name="Straight Arrow Connector 92">
+            <a:extLst>
+              <a:ext uri="{FF2B5EF4-FFF2-40B4-BE49-F238E27FC236}">
+                <a16:creationId xmlns:a16="http://schemas.microsoft.com/office/drawing/2014/main" id="{76F2793B-D4F2-4723-8541-FD44A48FA1B5}"/>
+              </a:ext>
+            </a:extLst>
+          </p:cNvPr>
+          <p:cNvCxnSpPr>
+            <a:cxnSpLocks/>
+            <a:stCxn id="79" idx="2"/>
+            <a:endCxn id="55" idx="0"/>
+          </p:cNvCxnSpPr>
+          <p:nvPr/>
+        </p:nvCxnSpPr>
+        <p:spPr>
+          <a:xfrm>
+            <a:off x="9324616" y="2200516"/>
+            <a:ext cx="2894" cy="131700"/>
+          </a:xfrm>
+          <a:prstGeom prst="straightConnector1">
+            <a:avLst/>
+          </a:prstGeom>
+          <a:ln w="38100">
+            <a:solidFill>
+              <a:schemeClr val="tx1"/>
+            </a:solidFill>
+            <a:tailEnd type="triangle"/>
+          </a:ln>
+        </p:spPr>
+        <p:style>
+          <a:lnRef idx="1">
+            <a:schemeClr val="accent1"/>
+          </a:lnRef>
+          <a:fillRef idx="0">
+            <a:schemeClr val="accent1"/>
+          </a:fillRef>
+          <a:effectRef idx="0">
+            <a:schemeClr val="accent1"/>
+          </a:effectRef>
+          <a:fontRef idx="minor">
+            <a:schemeClr val="tx1"/>
+          </a:fontRef>
+        </p:style>
+      </p:cxnSp>
+      <p:cxnSp>
+        <p:nvCxnSpPr>
+          <p:cNvPr id="97" name="Straight Arrow Connector 96">
+            <a:extLst>
+              <a:ext uri="{FF2B5EF4-FFF2-40B4-BE49-F238E27FC236}">
+                <a16:creationId xmlns:a16="http://schemas.microsoft.com/office/drawing/2014/main" id="{947A4A2C-4180-4AAB-B0B5-9B7F4311FDAC}"/>
+              </a:ext>
+            </a:extLst>
+          </p:cNvPr>
+          <p:cNvCxnSpPr>
+            <a:cxnSpLocks/>
+            <a:stCxn id="82" idx="2"/>
+            <a:endCxn id="62" idx="6"/>
+          </p:cNvCxnSpPr>
+          <p:nvPr/>
+        </p:nvCxnSpPr>
+        <p:spPr>
+          <a:xfrm flipH="1">
+            <a:off x="10035932" y="2784175"/>
+            <a:ext cx="1107116" cy="213246"/>
+          </a:xfrm>
+          <a:prstGeom prst="straightConnector1">
+            <a:avLst/>
+          </a:prstGeom>
+          <a:ln w="38100">
+            <a:solidFill>
+              <a:schemeClr val="tx1"/>
+            </a:solidFill>
+            <a:tailEnd type="triangle"/>
+          </a:ln>
+        </p:spPr>
+        <p:style>
+          <a:lnRef idx="1">
+            <a:schemeClr val="accent1"/>
+          </a:lnRef>
+          <a:fillRef idx="0">
+            <a:schemeClr val="accent1"/>
+          </a:fillRef>
+          <a:effectRef idx="0">
+            <a:schemeClr val="accent1"/>
+          </a:effectRef>
+          <a:fontRef idx="minor">
+            <a:schemeClr val="tx1"/>
+          </a:fontRef>
+        </p:style>
+      </p:cxnSp>
+      <p:sp>
+        <p:nvSpPr>
+          <p:cNvPr id="129" name="TextBox 128">
+            <a:extLst>
+              <a:ext uri="{FF2B5EF4-FFF2-40B4-BE49-F238E27FC236}">
+                <a16:creationId xmlns:a16="http://schemas.microsoft.com/office/drawing/2014/main" id="{FD9C29A3-DD54-430D-BD8B-AC8AD4BC7327}"/>
+              </a:ext>
+            </a:extLst>
+          </p:cNvPr>
+          <p:cNvSpPr txBox="1"/>
+          <p:nvPr/>
+        </p:nvSpPr>
+        <p:spPr>
+          <a:xfrm>
+            <a:off x="6840321" y="6265506"/>
+            <a:ext cx="1367131" cy="461665"/>
+          </a:xfrm>
+          <a:prstGeom prst="rect">
+            <a:avLst/>
+          </a:prstGeom>
+        </p:spPr>
+        <p:style>
+          <a:lnRef idx="2">
+            <a:schemeClr val="accent1"/>
+          </a:lnRef>
+          <a:fillRef idx="1">
+            <a:schemeClr val="lt1"/>
+          </a:fillRef>
+          <a:effectRef idx="0">
+            <a:schemeClr val="accent1"/>
+          </a:effectRef>
+          <a:fontRef idx="minor">
+            <a:schemeClr val="dk1"/>
+          </a:fontRef>
+        </p:style>
+        <p:txBody>
+          <a:bodyPr wrap="square" rtlCol="0">
+            <a:spAutoFit/>
+          </a:bodyPr>
+          <a:lstStyle/>
+          <a:p>
+            <a:pPr algn="ctr"/>
+            <a:r>
+              <a:rPr lang="en-US" sz="1200" dirty="0">
+                <a:solidFill>
+                  <a:schemeClr val="accent1">
+                    <a:lumMod val="75000"/>
+                  </a:schemeClr>
+                </a:solidFill>
+              </a:rPr>
+              <a:t>2 AP Test 33-66%, 2 AP Test 66-100%</a:t>
+            </a:r>
+          </a:p>
+        </p:txBody>
+      </p:sp>
+      <p:sp>
+        <p:nvSpPr>
+          <p:cNvPr id="130" name="TextBox 129">
+            <a:extLst>
+              <a:ext uri="{FF2B5EF4-FFF2-40B4-BE49-F238E27FC236}">
+                <a16:creationId xmlns:a16="http://schemas.microsoft.com/office/drawing/2014/main" id="{D390552C-830E-46CD-9D5E-EBDF5B1A7C2E}"/>
+              </a:ext>
+            </a:extLst>
+          </p:cNvPr>
+          <p:cNvSpPr txBox="1"/>
+          <p:nvPr/>
+        </p:nvSpPr>
+        <p:spPr>
+          <a:xfrm>
+            <a:off x="10638586" y="5922872"/>
+            <a:ext cx="1367131" cy="276999"/>
+          </a:xfrm>
+          <a:prstGeom prst="rect">
+            <a:avLst/>
+          </a:prstGeom>
+        </p:spPr>
+        <p:style>
+          <a:lnRef idx="2">
+            <a:schemeClr val="accent1"/>
+          </a:lnRef>
+          <a:fillRef idx="1">
+            <a:schemeClr val="lt1"/>
+          </a:fillRef>
+          <a:effectRef idx="0">
+            <a:schemeClr val="accent1"/>
+          </a:effectRef>
+          <a:fontRef idx="minor">
+            <a:schemeClr val="dk1"/>
+          </a:fontRef>
+        </p:style>
+        <p:txBody>
+          <a:bodyPr wrap="square" rtlCol="0">
+            <a:spAutoFit/>
+          </a:bodyPr>
+          <a:lstStyle/>
+          <a:p>
+            <a:pPr algn="ctr"/>
+            <a:r>
+              <a:rPr lang="en-US" sz="1200" dirty="0">
+                <a:solidFill>
+                  <a:schemeClr val="accent1">
+                    <a:lumMod val="75000"/>
+                  </a:schemeClr>
+                </a:solidFill>
+              </a:rPr>
+              <a:t>2 AP Test 66-100%</a:t>
+            </a:r>
+          </a:p>
+        </p:txBody>
+      </p:sp>
+      <p:sp>
+        <p:nvSpPr>
+          <p:cNvPr id="131" name="TextBox 130">
+            <a:extLst>
+              <a:ext uri="{FF2B5EF4-FFF2-40B4-BE49-F238E27FC236}">
+                <a16:creationId xmlns:a16="http://schemas.microsoft.com/office/drawing/2014/main" id="{9729033F-DC52-4358-B5BC-B2127AD30D5A}"/>
+              </a:ext>
+            </a:extLst>
+          </p:cNvPr>
+          <p:cNvSpPr txBox="1"/>
+          <p:nvPr/>
+        </p:nvSpPr>
+        <p:spPr>
+          <a:xfrm>
+            <a:off x="8265791" y="4210652"/>
+            <a:ext cx="1951683" cy="461665"/>
+          </a:xfrm>
+          <a:prstGeom prst="rect">
+            <a:avLst/>
+          </a:prstGeom>
+        </p:spPr>
+        <p:style>
+          <a:lnRef idx="2">
+            <a:schemeClr val="accent1"/>
+          </a:lnRef>
+          <a:fillRef idx="1">
+            <a:schemeClr val="lt1"/>
+          </a:fillRef>
+          <a:effectRef idx="0">
+            <a:schemeClr val="accent1"/>
+          </a:effectRef>
+          <a:fontRef idx="minor">
+            <a:schemeClr val="dk1"/>
+          </a:fontRef>
+        </p:style>
+        <p:txBody>
+          <a:bodyPr wrap="square" rtlCol="0">
+            <a:spAutoFit/>
+          </a:bodyPr>
+          <a:lstStyle/>
+          <a:p>
+            <a:pPr algn="ctr"/>
+            <a:r>
+              <a:rPr lang="en-US" sz="1200" dirty="0">
+                <a:solidFill>
+                  <a:schemeClr val="accent1">
+                    <a:lumMod val="75000"/>
+                  </a:schemeClr>
+                </a:solidFill>
+              </a:rPr>
+              <a:t>Total Enrollment 500-1000</a:t>
+            </a:r>
+          </a:p>
+          <a:p>
+            <a:pPr algn="ctr"/>
+            <a:r>
+              <a:rPr lang="en-US" sz="1200" dirty="0">
+                <a:solidFill>
+                  <a:schemeClr val="accent1">
+                    <a:lumMod val="75000"/>
+                  </a:schemeClr>
+                </a:solidFill>
+              </a:rPr>
+              <a:t>Total Enrollment 2500-3000 </a:t>
+            </a:r>
+          </a:p>
+        </p:txBody>
+      </p:sp>
+      <p:sp>
+        <p:nvSpPr>
+          <p:cNvPr id="133" name="TextBox 132">
+            <a:extLst>
+              <a:ext uri="{FF2B5EF4-FFF2-40B4-BE49-F238E27FC236}">
+                <a16:creationId xmlns:a16="http://schemas.microsoft.com/office/drawing/2014/main" id="{B97BFFDC-A121-43AE-A181-B9E2E1DE58B0}"/>
+              </a:ext>
+            </a:extLst>
+          </p:cNvPr>
+          <p:cNvSpPr txBox="1"/>
+          <p:nvPr/>
+        </p:nvSpPr>
+        <p:spPr>
+          <a:xfrm>
+            <a:off x="10420118" y="5165498"/>
+            <a:ext cx="1548209" cy="646331"/>
+          </a:xfrm>
+          <a:prstGeom prst="rect">
+            <a:avLst/>
+          </a:prstGeom>
+        </p:spPr>
+        <p:style>
+          <a:lnRef idx="2">
+            <a:schemeClr val="accent1"/>
+          </a:lnRef>
+          <a:fillRef idx="1">
+            <a:schemeClr val="lt1"/>
+          </a:fillRef>
+          <a:effectRef idx="0">
+            <a:schemeClr val="accent1"/>
+          </a:effectRef>
+          <a:fontRef idx="minor">
+            <a:schemeClr val="dk1"/>
+          </a:fontRef>
+        </p:style>
+        <p:txBody>
+          <a:bodyPr wrap="square" rtlCol="0">
+            <a:spAutoFit/>
+          </a:bodyPr>
+          <a:lstStyle/>
+          <a:p>
+            <a:pPr algn="ctr"/>
+            <a:r>
+              <a:rPr lang="en-US" sz="1200" dirty="0">
+                <a:solidFill>
+                  <a:schemeClr val="accent1">
+                    <a:lumMod val="75000"/>
+                  </a:schemeClr>
+                </a:solidFill>
+              </a:rPr>
+              <a:t>Avg Class Size 20-25, Avg Class Size 25-30, Avg Class Size 30-35</a:t>
+            </a:r>
+          </a:p>
+        </p:txBody>
+      </p:sp>
+      <p:sp>
+        <p:nvSpPr>
+          <p:cNvPr id="134" name="Oval 133">
+            <a:extLst>
+              <a:ext uri="{FF2B5EF4-FFF2-40B4-BE49-F238E27FC236}">
+                <a16:creationId xmlns:a16="http://schemas.microsoft.com/office/drawing/2014/main" id="{41C99EFE-8433-439F-8352-C2225C71F104}"/>
+              </a:ext>
+            </a:extLst>
+          </p:cNvPr>
+          <p:cNvSpPr/>
+          <p:nvPr/>
+        </p:nvSpPr>
+        <p:spPr>
+          <a:xfrm>
+            <a:off x="9138509" y="4835307"/>
+            <a:ext cx="222421" cy="222422"/>
+          </a:xfrm>
+          <a:prstGeom prst="ellipse">
+            <a:avLst/>
+          </a:prstGeom>
+          <a:ln>
+            <a:noFill/>
+          </a:ln>
+        </p:spPr>
+        <p:style>
+          <a:lnRef idx="2">
+            <a:schemeClr val="accent1">
+              <a:shade val="50000"/>
+            </a:schemeClr>
+          </a:lnRef>
+          <a:fillRef idx="1">
+            <a:schemeClr val="accent1"/>
+          </a:fillRef>
+          <a:effectRef idx="0">
+            <a:schemeClr val="accent1"/>
+          </a:effectRef>
+          <a:fontRef idx="minor">
+            <a:schemeClr val="lt1"/>
+          </a:fontRef>
+        </p:style>
+        <p:txBody>
+          <a:bodyPr rtlCol="0" anchor="ctr"/>
+          <a:lstStyle/>
+          <a:p>
+            <a:pPr algn="ctr"/>
+            <a:endParaRPr lang="en-US"/>
+          </a:p>
+        </p:txBody>
+      </p:sp>
+      <p:sp>
+        <p:nvSpPr>
+          <p:cNvPr id="135" name="Oval 134">
+            <a:extLst>
+              <a:ext uri="{FF2B5EF4-FFF2-40B4-BE49-F238E27FC236}">
+                <a16:creationId xmlns:a16="http://schemas.microsoft.com/office/drawing/2014/main" id="{C994938F-CD69-482A-A9CC-E14D75AC6420}"/>
+              </a:ext>
+            </a:extLst>
+          </p:cNvPr>
+          <p:cNvSpPr/>
+          <p:nvPr/>
+        </p:nvSpPr>
+        <p:spPr>
+          <a:xfrm>
+            <a:off x="8491838" y="5389301"/>
+            <a:ext cx="222421" cy="222422"/>
+          </a:xfrm>
+          <a:prstGeom prst="ellipse">
+            <a:avLst/>
+          </a:prstGeom>
+          <a:ln>
+            <a:noFill/>
+          </a:ln>
+        </p:spPr>
+        <p:style>
+          <a:lnRef idx="2">
+            <a:schemeClr val="accent1">
+              <a:shade val="50000"/>
+            </a:schemeClr>
+          </a:lnRef>
+          <a:fillRef idx="1">
+            <a:schemeClr val="accent1"/>
+          </a:fillRef>
+          <a:effectRef idx="0">
+            <a:schemeClr val="accent1"/>
+          </a:effectRef>
+          <a:fontRef idx="minor">
+            <a:schemeClr val="lt1"/>
+          </a:fontRef>
+        </p:style>
+        <p:txBody>
+          <a:bodyPr rtlCol="0" anchor="ctr"/>
+          <a:lstStyle/>
+          <a:p>
+            <a:pPr algn="ctr"/>
+            <a:endParaRPr lang="en-US"/>
+          </a:p>
+        </p:txBody>
+      </p:sp>
+      <p:sp>
+        <p:nvSpPr>
+          <p:cNvPr id="136" name="Oval 135">
+            <a:extLst>
+              <a:ext uri="{FF2B5EF4-FFF2-40B4-BE49-F238E27FC236}">
+                <a16:creationId xmlns:a16="http://schemas.microsoft.com/office/drawing/2014/main" id="{39EAD3CB-4A8E-4D8F-BB3C-17528DFBA8B2}"/>
+              </a:ext>
+            </a:extLst>
+          </p:cNvPr>
+          <p:cNvSpPr/>
+          <p:nvPr/>
+        </p:nvSpPr>
+        <p:spPr>
+          <a:xfrm>
+            <a:off x="9735721" y="5389301"/>
+            <a:ext cx="222421" cy="222422"/>
+          </a:xfrm>
+          <a:prstGeom prst="ellipse">
+            <a:avLst/>
+          </a:prstGeom>
+          <a:ln>
+            <a:noFill/>
+          </a:ln>
+        </p:spPr>
+        <p:style>
+          <a:lnRef idx="2">
+            <a:schemeClr val="accent1">
+              <a:shade val="50000"/>
+            </a:schemeClr>
+          </a:lnRef>
+          <a:fillRef idx="1">
+            <a:schemeClr val="accent1"/>
+          </a:fillRef>
+          <a:effectRef idx="0">
+            <a:schemeClr val="accent1"/>
+          </a:effectRef>
+          <a:fontRef idx="minor">
+            <a:schemeClr val="lt1"/>
+          </a:fontRef>
+        </p:style>
+        <p:txBody>
+          <a:bodyPr rtlCol="0" anchor="ctr"/>
+          <a:lstStyle/>
+          <a:p>
+            <a:pPr algn="ctr"/>
+            <a:endParaRPr lang="en-US"/>
+          </a:p>
+        </p:txBody>
+      </p:sp>
+      <p:sp>
+        <p:nvSpPr>
+          <p:cNvPr id="137" name="Oval 136">
+            <a:extLst>
+              <a:ext uri="{FF2B5EF4-FFF2-40B4-BE49-F238E27FC236}">
+                <a16:creationId xmlns:a16="http://schemas.microsoft.com/office/drawing/2014/main" id="{0A501DF6-40B3-4CCD-848C-EF0BEA78606F}"/>
+              </a:ext>
+            </a:extLst>
+          </p:cNvPr>
+          <p:cNvSpPr/>
+          <p:nvPr/>
+        </p:nvSpPr>
+        <p:spPr>
+          <a:xfrm>
+            <a:off x="8167432" y="5943295"/>
+            <a:ext cx="222421" cy="222422"/>
+          </a:xfrm>
+          <a:prstGeom prst="ellipse">
+            <a:avLst/>
+          </a:prstGeom>
+          <a:solidFill>
+            <a:srgbClr val="7030A0"/>
+          </a:solidFill>
+          <a:ln>
+            <a:noFill/>
+          </a:ln>
+        </p:spPr>
+        <p:style>
+          <a:lnRef idx="2">
+            <a:schemeClr val="accent1">
+              <a:shade val="50000"/>
+            </a:schemeClr>
+          </a:lnRef>
+          <a:fillRef idx="1">
+            <a:schemeClr val="accent1"/>
+          </a:fillRef>
+          <a:effectRef idx="0">
+            <a:schemeClr val="accent1"/>
+          </a:effectRef>
+          <a:fontRef idx="minor">
+            <a:schemeClr val="lt1"/>
+          </a:fontRef>
+        </p:style>
+        <p:txBody>
+          <a:bodyPr rtlCol="0" anchor="ctr"/>
+          <a:lstStyle/>
+          <a:p>
+            <a:pPr algn="ctr"/>
+            <a:endParaRPr lang="en-US"/>
+          </a:p>
+        </p:txBody>
+      </p:sp>
+      <p:sp>
+        <p:nvSpPr>
+          <p:cNvPr id="138" name="Oval 137">
+            <a:extLst>
+              <a:ext uri="{FF2B5EF4-FFF2-40B4-BE49-F238E27FC236}">
+                <a16:creationId xmlns:a16="http://schemas.microsoft.com/office/drawing/2014/main" id="{CB10C243-EF59-4F77-8549-D66CA5463621}"/>
+              </a:ext>
+            </a:extLst>
+          </p:cNvPr>
+          <p:cNvSpPr/>
+          <p:nvPr/>
+        </p:nvSpPr>
+        <p:spPr>
+          <a:xfrm>
+            <a:off x="8814103" y="5943295"/>
+            <a:ext cx="222421" cy="222422"/>
+          </a:xfrm>
+          <a:prstGeom prst="ellipse">
+            <a:avLst/>
+          </a:prstGeom>
+          <a:ln>
+            <a:noFill/>
+          </a:ln>
+        </p:spPr>
+        <p:style>
+          <a:lnRef idx="2">
+            <a:schemeClr val="accent1">
+              <a:shade val="50000"/>
+            </a:schemeClr>
+          </a:lnRef>
+          <a:fillRef idx="1">
+            <a:schemeClr val="accent1"/>
+          </a:fillRef>
+          <a:effectRef idx="0">
+            <a:schemeClr val="accent1"/>
+          </a:effectRef>
+          <a:fontRef idx="minor">
+            <a:schemeClr val="lt1"/>
+          </a:fontRef>
+        </p:style>
+        <p:txBody>
+          <a:bodyPr rtlCol="0" anchor="ctr"/>
+          <a:lstStyle/>
+          <a:p>
+            <a:pPr algn="ctr"/>
+            <a:endParaRPr lang="en-US"/>
+          </a:p>
+        </p:txBody>
+      </p:sp>
+      <p:sp>
+        <p:nvSpPr>
+          <p:cNvPr id="139" name="Oval 138">
+            <a:extLst>
+              <a:ext uri="{FF2B5EF4-FFF2-40B4-BE49-F238E27FC236}">
+                <a16:creationId xmlns:a16="http://schemas.microsoft.com/office/drawing/2014/main" id="{846647DC-7BE6-4494-B488-9AC4675E8678}"/>
+              </a:ext>
+            </a:extLst>
+          </p:cNvPr>
+          <p:cNvSpPr/>
+          <p:nvPr/>
+        </p:nvSpPr>
+        <p:spPr>
+          <a:xfrm>
+            <a:off x="9421627" y="5943295"/>
+            <a:ext cx="222421" cy="222422"/>
+          </a:xfrm>
+          <a:prstGeom prst="ellipse">
+            <a:avLst/>
+          </a:prstGeom>
+          <a:solidFill>
+            <a:srgbClr val="7030A0"/>
+          </a:solidFill>
+          <a:ln>
+            <a:noFill/>
+          </a:ln>
+        </p:spPr>
+        <p:style>
+          <a:lnRef idx="2">
+            <a:schemeClr val="accent1">
+              <a:shade val="50000"/>
+            </a:schemeClr>
+          </a:lnRef>
+          <a:fillRef idx="1">
+            <a:schemeClr val="accent1"/>
+          </a:fillRef>
+          <a:effectRef idx="0">
+            <a:schemeClr val="accent1"/>
+          </a:effectRef>
+          <a:fontRef idx="minor">
+            <a:schemeClr val="lt1"/>
+          </a:fontRef>
+        </p:style>
+        <p:txBody>
+          <a:bodyPr rtlCol="0" anchor="ctr"/>
+          <a:lstStyle/>
+          <a:p>
+            <a:pPr algn="ctr"/>
+            <a:endParaRPr lang="en-US"/>
+          </a:p>
+        </p:txBody>
+      </p:sp>
+      <p:sp>
+        <p:nvSpPr>
+          <p:cNvPr id="140" name="Oval 139">
+            <a:extLst>
+              <a:ext uri="{FF2B5EF4-FFF2-40B4-BE49-F238E27FC236}">
+                <a16:creationId xmlns:a16="http://schemas.microsoft.com/office/drawing/2014/main" id="{1700CB08-4745-482C-AAE5-872046011243}"/>
+              </a:ext>
+            </a:extLst>
+          </p:cNvPr>
+          <p:cNvSpPr/>
+          <p:nvPr/>
+        </p:nvSpPr>
+        <p:spPr>
+          <a:xfrm>
+            <a:off x="10068298" y="5943295"/>
+            <a:ext cx="222421" cy="222422"/>
+          </a:xfrm>
+          <a:prstGeom prst="ellipse">
+            <a:avLst/>
+          </a:prstGeom>
+          <a:ln>
+            <a:noFill/>
+          </a:ln>
+        </p:spPr>
+        <p:style>
+          <a:lnRef idx="2">
+            <a:schemeClr val="accent1">
+              <a:shade val="50000"/>
+            </a:schemeClr>
+          </a:lnRef>
+          <a:fillRef idx="1">
+            <a:schemeClr val="accent1"/>
+          </a:fillRef>
+          <a:effectRef idx="0">
+            <a:schemeClr val="accent1"/>
+          </a:effectRef>
+          <a:fontRef idx="minor">
+            <a:schemeClr val="lt1"/>
+          </a:fontRef>
+        </p:style>
+        <p:txBody>
+          <a:bodyPr rtlCol="0" anchor="ctr"/>
+          <a:lstStyle/>
+          <a:p>
+            <a:pPr algn="ctr"/>
+            <a:endParaRPr lang="en-US"/>
+          </a:p>
+        </p:txBody>
+      </p:sp>
+      <p:sp>
+        <p:nvSpPr>
+          <p:cNvPr id="141" name="Oval 140">
+            <a:extLst>
+              <a:ext uri="{FF2B5EF4-FFF2-40B4-BE49-F238E27FC236}">
+                <a16:creationId xmlns:a16="http://schemas.microsoft.com/office/drawing/2014/main" id="{4BC91EF7-C3E7-4D26-8753-D751EBB30262}"/>
+              </a:ext>
+            </a:extLst>
+          </p:cNvPr>
+          <p:cNvSpPr/>
+          <p:nvPr/>
+        </p:nvSpPr>
+        <p:spPr>
+          <a:xfrm>
+            <a:off x="9737947" y="6513765"/>
+            <a:ext cx="222421" cy="222422"/>
+          </a:xfrm>
+          <a:prstGeom prst="ellipse">
+            <a:avLst/>
+          </a:prstGeom>
+          <a:solidFill>
+            <a:srgbClr val="7030A0"/>
+          </a:solidFill>
+          <a:ln>
+            <a:noFill/>
+          </a:ln>
+        </p:spPr>
+        <p:style>
+          <a:lnRef idx="2">
+            <a:schemeClr val="accent1">
+              <a:shade val="50000"/>
+            </a:schemeClr>
+          </a:lnRef>
+          <a:fillRef idx="1">
+            <a:schemeClr val="accent1"/>
+          </a:fillRef>
+          <a:effectRef idx="0">
+            <a:schemeClr val="accent1"/>
+          </a:effectRef>
+          <a:fontRef idx="minor">
+            <a:schemeClr val="lt1"/>
+          </a:fontRef>
+        </p:style>
+        <p:txBody>
+          <a:bodyPr rtlCol="0" anchor="ctr"/>
+          <a:lstStyle/>
+          <a:p>
+            <a:pPr algn="ctr"/>
+            <a:endParaRPr lang="en-US"/>
+          </a:p>
+        </p:txBody>
+      </p:sp>
+      <p:sp>
+        <p:nvSpPr>
+          <p:cNvPr id="142" name="Oval 141">
+            <a:extLst>
+              <a:ext uri="{FF2B5EF4-FFF2-40B4-BE49-F238E27FC236}">
+                <a16:creationId xmlns:a16="http://schemas.microsoft.com/office/drawing/2014/main" id="{05D3A5E1-48C9-4980-9F40-4C235F49482E}"/>
+              </a:ext>
+            </a:extLst>
+          </p:cNvPr>
+          <p:cNvSpPr/>
+          <p:nvPr/>
+        </p:nvSpPr>
+        <p:spPr>
+          <a:xfrm>
+            <a:off x="10384618" y="6513765"/>
+            <a:ext cx="222421" cy="222422"/>
+          </a:xfrm>
+          <a:prstGeom prst="ellipse">
+            <a:avLst/>
+          </a:prstGeom>
+          <a:solidFill>
+            <a:srgbClr val="FF0000"/>
+          </a:solidFill>
+          <a:ln>
+            <a:noFill/>
+          </a:ln>
+        </p:spPr>
+        <p:style>
+          <a:lnRef idx="2">
+            <a:schemeClr val="accent1">
+              <a:shade val="50000"/>
+            </a:schemeClr>
+          </a:lnRef>
+          <a:fillRef idx="1">
+            <a:schemeClr val="accent1"/>
+          </a:fillRef>
+          <a:effectRef idx="0">
+            <a:schemeClr val="accent1"/>
+          </a:effectRef>
+          <a:fontRef idx="minor">
+            <a:schemeClr val="lt1"/>
+          </a:fontRef>
+        </p:style>
+        <p:txBody>
+          <a:bodyPr rtlCol="0" anchor="ctr"/>
+          <a:lstStyle/>
+          <a:p>
+            <a:pPr algn="ctr"/>
+            <a:endParaRPr lang="en-US"/>
+          </a:p>
+        </p:txBody>
+      </p:sp>
+      <p:sp>
+        <p:nvSpPr>
+          <p:cNvPr id="143" name="Oval 142">
+            <a:extLst>
+              <a:ext uri="{FF2B5EF4-FFF2-40B4-BE49-F238E27FC236}">
+                <a16:creationId xmlns:a16="http://schemas.microsoft.com/office/drawing/2014/main" id="{349F74E7-8A59-4774-835A-1251382EA162}"/>
+              </a:ext>
+            </a:extLst>
+          </p:cNvPr>
+          <p:cNvSpPr/>
+          <p:nvPr/>
+        </p:nvSpPr>
+        <p:spPr>
+          <a:xfrm>
+            <a:off x="8483752" y="6494954"/>
+            <a:ext cx="222421" cy="222422"/>
+          </a:xfrm>
+          <a:prstGeom prst="ellipse">
+            <a:avLst/>
+          </a:prstGeom>
+          <a:solidFill>
+            <a:srgbClr val="7030A0"/>
+          </a:solidFill>
+          <a:ln>
+            <a:noFill/>
+          </a:ln>
+        </p:spPr>
+        <p:style>
+          <a:lnRef idx="2">
+            <a:schemeClr val="accent1">
+              <a:shade val="50000"/>
+            </a:schemeClr>
+          </a:lnRef>
+          <a:fillRef idx="1">
+            <a:schemeClr val="accent1"/>
+          </a:fillRef>
+          <a:effectRef idx="0">
+            <a:schemeClr val="accent1"/>
+          </a:effectRef>
+          <a:fontRef idx="minor">
+            <a:schemeClr val="lt1"/>
+          </a:fontRef>
+        </p:style>
+        <p:txBody>
+          <a:bodyPr rtlCol="0" anchor="ctr"/>
+          <a:lstStyle/>
+          <a:p>
+            <a:pPr algn="ctr"/>
+            <a:endParaRPr lang="en-US"/>
+          </a:p>
+        </p:txBody>
+      </p:sp>
+      <p:sp>
+        <p:nvSpPr>
+          <p:cNvPr id="144" name="Oval 143">
+            <a:extLst>
+              <a:ext uri="{FF2B5EF4-FFF2-40B4-BE49-F238E27FC236}">
+                <a16:creationId xmlns:a16="http://schemas.microsoft.com/office/drawing/2014/main" id="{5AD79881-38EF-48B8-A84A-193A99FCABF3}"/>
+              </a:ext>
+            </a:extLst>
+          </p:cNvPr>
+          <p:cNvSpPr/>
+          <p:nvPr/>
+        </p:nvSpPr>
+        <p:spPr>
+          <a:xfrm>
+            <a:off x="9130423" y="6494954"/>
+            <a:ext cx="222421" cy="222422"/>
+          </a:xfrm>
+          <a:prstGeom prst="ellipse">
+            <a:avLst/>
+          </a:prstGeom>
+          <a:solidFill>
+            <a:srgbClr val="FF0000"/>
+          </a:solidFill>
+          <a:ln>
+            <a:noFill/>
+          </a:ln>
+        </p:spPr>
+        <p:style>
+          <a:lnRef idx="2">
+            <a:schemeClr val="accent1">
+              <a:shade val="50000"/>
+            </a:schemeClr>
+          </a:lnRef>
+          <a:fillRef idx="1">
+            <a:schemeClr val="accent1"/>
+          </a:fillRef>
+          <a:effectRef idx="0">
+            <a:schemeClr val="accent1"/>
+          </a:effectRef>
+          <a:fontRef idx="minor">
+            <a:schemeClr val="lt1"/>
+          </a:fontRef>
+        </p:style>
+        <p:txBody>
+          <a:bodyPr rtlCol="0" anchor="ctr"/>
+          <a:lstStyle/>
+          <a:p>
+            <a:pPr algn="ctr"/>
+            <a:endParaRPr lang="en-US"/>
+          </a:p>
+        </p:txBody>
+      </p:sp>
+      <p:cxnSp>
+        <p:nvCxnSpPr>
+          <p:cNvPr id="145" name="Straight Connector 144">
+            <a:extLst>
+              <a:ext uri="{FF2B5EF4-FFF2-40B4-BE49-F238E27FC236}">
+                <a16:creationId xmlns:a16="http://schemas.microsoft.com/office/drawing/2014/main" id="{F8233463-66DD-4EB8-B634-7D2FAE85D279}"/>
+              </a:ext>
+            </a:extLst>
+          </p:cNvPr>
+          <p:cNvCxnSpPr>
+            <a:cxnSpLocks/>
+            <a:stCxn id="134" idx="4"/>
+            <a:endCxn id="135" idx="0"/>
+          </p:cNvCxnSpPr>
+          <p:nvPr/>
+        </p:nvCxnSpPr>
+        <p:spPr>
+          <a:xfrm flipH="1">
+            <a:off x="8603049" y="5057729"/>
+            <a:ext cx="646671" cy="331572"/>
+          </a:xfrm>
+          <a:prstGeom prst="line">
+            <a:avLst/>
+          </a:prstGeom>
+          <a:ln w="38100">
+            <a:solidFill>
+              <a:schemeClr val="tx1"/>
+            </a:solidFill>
+          </a:ln>
+        </p:spPr>
+        <p:style>
+          <a:lnRef idx="1">
+            <a:schemeClr val="accent1"/>
+          </a:lnRef>
+          <a:fillRef idx="0">
+            <a:schemeClr val="accent1"/>
+          </a:fillRef>
+          <a:effectRef idx="0">
+            <a:schemeClr val="accent1"/>
+          </a:effectRef>
+          <a:fontRef idx="minor">
+            <a:schemeClr val="tx1"/>
+          </a:fontRef>
+        </p:style>
+      </p:cxnSp>
+      <p:cxnSp>
+        <p:nvCxnSpPr>
+          <p:cNvPr id="146" name="Straight Connector 145">
+            <a:extLst>
+              <a:ext uri="{FF2B5EF4-FFF2-40B4-BE49-F238E27FC236}">
+                <a16:creationId xmlns:a16="http://schemas.microsoft.com/office/drawing/2014/main" id="{0021C1B9-0D6E-4EE2-8B92-8F1733549F18}"/>
+              </a:ext>
+            </a:extLst>
+          </p:cNvPr>
+          <p:cNvCxnSpPr>
+            <a:cxnSpLocks/>
+            <a:stCxn id="134" idx="4"/>
+            <a:endCxn id="136" idx="0"/>
+          </p:cNvCxnSpPr>
+          <p:nvPr/>
+        </p:nvCxnSpPr>
+        <p:spPr>
+          <a:xfrm>
+            <a:off x="9249720" y="5057729"/>
+            <a:ext cx="597212" cy="331572"/>
+          </a:xfrm>
+          <a:prstGeom prst="line">
+            <a:avLst/>
+          </a:prstGeom>
+          <a:ln w="38100">
+            <a:solidFill>
+              <a:schemeClr val="tx1"/>
+            </a:solidFill>
+          </a:ln>
+        </p:spPr>
+        <p:style>
+          <a:lnRef idx="1">
+            <a:schemeClr val="accent1"/>
+          </a:lnRef>
+          <a:fillRef idx="0">
+            <a:schemeClr val="accent1"/>
+          </a:fillRef>
+          <a:effectRef idx="0">
+            <a:schemeClr val="accent1"/>
+          </a:effectRef>
+          <a:fontRef idx="minor">
+            <a:schemeClr val="tx1"/>
+          </a:fontRef>
+        </p:style>
+      </p:cxnSp>
+      <p:cxnSp>
+        <p:nvCxnSpPr>
+          <p:cNvPr id="147" name="Straight Connector 146">
+            <a:extLst>
+              <a:ext uri="{FF2B5EF4-FFF2-40B4-BE49-F238E27FC236}">
+                <a16:creationId xmlns:a16="http://schemas.microsoft.com/office/drawing/2014/main" id="{513361DB-EC66-4C6E-98A7-67A9CDF61B18}"/>
+              </a:ext>
+            </a:extLst>
+          </p:cNvPr>
+          <p:cNvCxnSpPr>
+            <a:cxnSpLocks/>
+            <a:stCxn id="135" idx="4"/>
+            <a:endCxn id="137" idx="0"/>
+          </p:cNvCxnSpPr>
+          <p:nvPr/>
+        </p:nvCxnSpPr>
+        <p:spPr>
+          <a:xfrm flipH="1">
+            <a:off x="8278643" y="5611723"/>
+            <a:ext cx="324406" cy="331572"/>
+          </a:xfrm>
+          <a:prstGeom prst="line">
+            <a:avLst/>
+          </a:prstGeom>
+          <a:ln w="38100">
+            <a:solidFill>
+              <a:schemeClr val="tx1"/>
+            </a:solidFill>
+          </a:ln>
+        </p:spPr>
+        <p:style>
+          <a:lnRef idx="1">
+            <a:schemeClr val="accent1"/>
+          </a:lnRef>
+          <a:fillRef idx="0">
+            <a:schemeClr val="accent1"/>
+          </a:fillRef>
+          <a:effectRef idx="0">
+            <a:schemeClr val="accent1"/>
+          </a:effectRef>
+          <a:fontRef idx="minor">
+            <a:schemeClr val="tx1"/>
+          </a:fontRef>
+        </p:style>
+      </p:cxnSp>
+      <p:cxnSp>
+        <p:nvCxnSpPr>
+          <p:cNvPr id="148" name="Straight Connector 147">
+            <a:extLst>
+              <a:ext uri="{FF2B5EF4-FFF2-40B4-BE49-F238E27FC236}">
+                <a16:creationId xmlns:a16="http://schemas.microsoft.com/office/drawing/2014/main" id="{227C4121-3B41-4BA5-873D-6FA3E3D6844E}"/>
+              </a:ext>
+            </a:extLst>
+          </p:cNvPr>
+          <p:cNvCxnSpPr>
+            <a:cxnSpLocks/>
+            <a:stCxn id="135" idx="4"/>
+            <a:endCxn id="138" idx="0"/>
+          </p:cNvCxnSpPr>
+          <p:nvPr/>
+        </p:nvCxnSpPr>
+        <p:spPr>
+          <a:xfrm>
+            <a:off x="8603049" y="5611723"/>
+            <a:ext cx="322265" cy="331572"/>
+          </a:xfrm>
+          <a:prstGeom prst="line">
+            <a:avLst/>
+          </a:prstGeom>
+          <a:ln w="38100">
+            <a:solidFill>
+              <a:schemeClr val="tx1"/>
+            </a:solidFill>
+          </a:ln>
+        </p:spPr>
+        <p:style>
+          <a:lnRef idx="1">
+            <a:schemeClr val="accent1"/>
+          </a:lnRef>
+          <a:fillRef idx="0">
+            <a:schemeClr val="accent1"/>
+          </a:fillRef>
+          <a:effectRef idx="0">
+            <a:schemeClr val="accent1"/>
+          </a:effectRef>
+          <a:fontRef idx="minor">
+            <a:schemeClr val="tx1"/>
+          </a:fontRef>
+        </p:style>
+      </p:cxnSp>
+      <p:cxnSp>
+        <p:nvCxnSpPr>
+          <p:cNvPr id="149" name="Straight Connector 148">
+            <a:extLst>
+              <a:ext uri="{FF2B5EF4-FFF2-40B4-BE49-F238E27FC236}">
+                <a16:creationId xmlns:a16="http://schemas.microsoft.com/office/drawing/2014/main" id="{21404494-C166-4C50-85E8-443CB7B6CEE2}"/>
+              </a:ext>
+            </a:extLst>
+          </p:cNvPr>
+          <p:cNvCxnSpPr>
+            <a:cxnSpLocks/>
+            <a:stCxn id="136" idx="4"/>
+            <a:endCxn id="139" idx="0"/>
+          </p:cNvCxnSpPr>
+          <p:nvPr/>
+        </p:nvCxnSpPr>
+        <p:spPr>
+          <a:xfrm flipH="1">
+            <a:off x="9532838" y="5611723"/>
+            <a:ext cx="314094" cy="331572"/>
+          </a:xfrm>
+          <a:prstGeom prst="line">
+            <a:avLst/>
+          </a:prstGeom>
+          <a:ln w="38100">
+            <a:solidFill>
+              <a:schemeClr val="tx1"/>
+            </a:solidFill>
+          </a:ln>
+        </p:spPr>
+        <p:style>
+          <a:lnRef idx="1">
+            <a:schemeClr val="accent1"/>
+          </a:lnRef>
+          <a:fillRef idx="0">
+            <a:schemeClr val="accent1"/>
+          </a:fillRef>
+          <a:effectRef idx="0">
+            <a:schemeClr val="accent1"/>
+          </a:effectRef>
+          <a:fontRef idx="minor">
+            <a:schemeClr val="tx1"/>
+          </a:fontRef>
+        </p:style>
+      </p:cxnSp>
+      <p:cxnSp>
+        <p:nvCxnSpPr>
+          <p:cNvPr id="150" name="Straight Connector 149">
+            <a:extLst>
+              <a:ext uri="{FF2B5EF4-FFF2-40B4-BE49-F238E27FC236}">
+                <a16:creationId xmlns:a16="http://schemas.microsoft.com/office/drawing/2014/main" id="{0C4D8C33-BE33-4E07-8742-A83EA59D986E}"/>
+              </a:ext>
+            </a:extLst>
+          </p:cNvPr>
+          <p:cNvCxnSpPr>
+            <a:cxnSpLocks/>
+            <a:stCxn id="136" idx="4"/>
+            <a:endCxn id="140" idx="0"/>
+          </p:cNvCxnSpPr>
+          <p:nvPr/>
+        </p:nvCxnSpPr>
+        <p:spPr>
+          <a:xfrm>
+            <a:off x="9846932" y="5611723"/>
+            <a:ext cx="332577" cy="331572"/>
+          </a:xfrm>
+          <a:prstGeom prst="line">
+            <a:avLst/>
+          </a:prstGeom>
+          <a:ln w="38100">
+            <a:solidFill>
+              <a:schemeClr val="tx1"/>
+            </a:solidFill>
+          </a:ln>
+        </p:spPr>
+        <p:style>
+          <a:lnRef idx="1">
+            <a:schemeClr val="accent1"/>
+          </a:lnRef>
+          <a:fillRef idx="0">
+            <a:schemeClr val="accent1"/>
+          </a:fillRef>
+          <a:effectRef idx="0">
+            <a:schemeClr val="accent1"/>
+          </a:effectRef>
+          <a:fontRef idx="minor">
+            <a:schemeClr val="tx1"/>
+          </a:fontRef>
+        </p:style>
+      </p:cxnSp>
+      <p:cxnSp>
+        <p:nvCxnSpPr>
+          <p:cNvPr id="151" name="Straight Connector 150">
+            <a:extLst>
+              <a:ext uri="{FF2B5EF4-FFF2-40B4-BE49-F238E27FC236}">
+                <a16:creationId xmlns:a16="http://schemas.microsoft.com/office/drawing/2014/main" id="{71AEE786-972F-4857-B536-35115D078E60}"/>
+              </a:ext>
+            </a:extLst>
+          </p:cNvPr>
+          <p:cNvCxnSpPr>
+            <a:cxnSpLocks/>
+            <a:stCxn id="138" idx="4"/>
+            <a:endCxn id="144" idx="0"/>
+          </p:cNvCxnSpPr>
+          <p:nvPr/>
+        </p:nvCxnSpPr>
+        <p:spPr>
+          <a:xfrm>
+            <a:off x="8925314" y="6165717"/>
+            <a:ext cx="316320" cy="329237"/>
+          </a:xfrm>
+          <a:prstGeom prst="line">
+            <a:avLst/>
+          </a:prstGeom>
+          <a:ln w="38100">
+            <a:solidFill>
+              <a:schemeClr val="tx1"/>
+            </a:solidFill>
+          </a:ln>
+        </p:spPr>
+        <p:style>
+          <a:lnRef idx="1">
+            <a:schemeClr val="accent1"/>
+          </a:lnRef>
+          <a:fillRef idx="0">
+            <a:schemeClr val="accent1"/>
+          </a:fillRef>
+          <a:effectRef idx="0">
+            <a:schemeClr val="accent1"/>
+          </a:effectRef>
+          <a:fontRef idx="minor">
+            <a:schemeClr val="tx1"/>
+          </a:fontRef>
+        </p:style>
+      </p:cxnSp>
+      <p:cxnSp>
+        <p:nvCxnSpPr>
+          <p:cNvPr id="152" name="Straight Connector 151">
+            <a:extLst>
+              <a:ext uri="{FF2B5EF4-FFF2-40B4-BE49-F238E27FC236}">
+                <a16:creationId xmlns:a16="http://schemas.microsoft.com/office/drawing/2014/main" id="{C6D9F542-AACF-4C05-9467-DEEFF5C46A6F}"/>
+              </a:ext>
+            </a:extLst>
+          </p:cNvPr>
+          <p:cNvCxnSpPr>
+            <a:cxnSpLocks/>
+            <a:stCxn id="138" idx="4"/>
+            <a:endCxn id="143" idx="0"/>
+          </p:cNvCxnSpPr>
+          <p:nvPr/>
+        </p:nvCxnSpPr>
+        <p:spPr>
+          <a:xfrm flipH="1">
+            <a:off x="8594963" y="6165717"/>
+            <a:ext cx="330351" cy="329237"/>
+          </a:xfrm>
+          <a:prstGeom prst="line">
+            <a:avLst/>
+          </a:prstGeom>
+          <a:ln w="38100">
+            <a:solidFill>
+              <a:schemeClr val="tx1"/>
+            </a:solidFill>
+          </a:ln>
+        </p:spPr>
+        <p:style>
+          <a:lnRef idx="1">
+            <a:schemeClr val="accent1"/>
+          </a:lnRef>
+          <a:fillRef idx="0">
+            <a:schemeClr val="accent1"/>
+          </a:fillRef>
+          <a:effectRef idx="0">
+            <a:schemeClr val="accent1"/>
+          </a:effectRef>
+          <a:fontRef idx="minor">
+            <a:schemeClr val="tx1"/>
+          </a:fontRef>
+        </p:style>
+      </p:cxnSp>
+      <p:cxnSp>
+        <p:nvCxnSpPr>
+          <p:cNvPr id="153" name="Straight Connector 152">
+            <a:extLst>
+              <a:ext uri="{FF2B5EF4-FFF2-40B4-BE49-F238E27FC236}">
+                <a16:creationId xmlns:a16="http://schemas.microsoft.com/office/drawing/2014/main" id="{552BE415-322C-462F-A844-F8D7B3B7AB91}"/>
+              </a:ext>
+            </a:extLst>
+          </p:cNvPr>
+          <p:cNvCxnSpPr>
+            <a:cxnSpLocks/>
+            <a:stCxn id="140" idx="4"/>
+            <a:endCxn id="141" idx="0"/>
+          </p:cNvCxnSpPr>
+          <p:nvPr/>
+        </p:nvCxnSpPr>
+        <p:spPr>
+          <a:xfrm flipH="1">
+            <a:off x="9849158" y="6165717"/>
+            <a:ext cx="330351" cy="348048"/>
+          </a:xfrm>
+          <a:prstGeom prst="line">
+            <a:avLst/>
+          </a:prstGeom>
+          <a:ln w="38100">
+            <a:solidFill>
+              <a:schemeClr val="tx1"/>
+            </a:solidFill>
+          </a:ln>
+        </p:spPr>
+        <p:style>
+          <a:lnRef idx="1">
+            <a:schemeClr val="accent1"/>
+          </a:lnRef>
+          <a:fillRef idx="0">
+            <a:schemeClr val="accent1"/>
+          </a:fillRef>
+          <a:effectRef idx="0">
+            <a:schemeClr val="accent1"/>
+          </a:effectRef>
+          <a:fontRef idx="minor">
+            <a:schemeClr val="tx1"/>
+          </a:fontRef>
+        </p:style>
+      </p:cxnSp>
+      <p:cxnSp>
+        <p:nvCxnSpPr>
+          <p:cNvPr id="154" name="Straight Connector 153">
+            <a:extLst>
+              <a:ext uri="{FF2B5EF4-FFF2-40B4-BE49-F238E27FC236}">
+                <a16:creationId xmlns:a16="http://schemas.microsoft.com/office/drawing/2014/main" id="{3141E310-97DD-4C4B-9FDC-2EA9CD5C4386}"/>
+              </a:ext>
+            </a:extLst>
+          </p:cNvPr>
+          <p:cNvCxnSpPr>
+            <a:cxnSpLocks/>
+            <a:stCxn id="140" idx="4"/>
+            <a:endCxn id="142" idx="0"/>
+          </p:cNvCxnSpPr>
+          <p:nvPr/>
+        </p:nvCxnSpPr>
+        <p:spPr>
+          <a:xfrm>
+            <a:off x="10179509" y="6165717"/>
+            <a:ext cx="316320" cy="348048"/>
+          </a:xfrm>
+          <a:prstGeom prst="line">
+            <a:avLst/>
+          </a:prstGeom>
+          <a:ln w="38100">
+            <a:solidFill>
+              <a:schemeClr val="tx1"/>
+            </a:solidFill>
+          </a:ln>
+        </p:spPr>
+        <p:style>
+          <a:lnRef idx="1">
+            <a:schemeClr val="accent1"/>
+          </a:lnRef>
+          <a:fillRef idx="0">
+            <a:schemeClr val="accent1"/>
+          </a:fillRef>
+          <a:effectRef idx="0">
+            <a:schemeClr val="accent1"/>
+          </a:effectRef>
+          <a:fontRef idx="minor">
+            <a:schemeClr val="tx1"/>
+          </a:fontRef>
+        </p:style>
+      </p:cxnSp>
+      <p:sp>
+        <p:nvSpPr>
+          <p:cNvPr id="155" name="Flowchart: Off-page Connector 154">
+            <a:extLst>
+              <a:ext uri="{FF2B5EF4-FFF2-40B4-BE49-F238E27FC236}">
+                <a16:creationId xmlns:a16="http://schemas.microsoft.com/office/drawing/2014/main" id="{B5CDE6C0-25C9-48D8-BF96-0D8F73BEF460}"/>
+              </a:ext>
+            </a:extLst>
+          </p:cNvPr>
+          <p:cNvSpPr/>
+          <p:nvPr/>
+        </p:nvSpPr>
+        <p:spPr>
+          <a:xfrm>
+            <a:off x="8112897" y="4859780"/>
+            <a:ext cx="222421" cy="331572"/>
+          </a:xfrm>
+          <a:prstGeom prst="flowChartOffpageConnector">
+            <a:avLst/>
+          </a:prstGeom>
+          <a:solidFill>
+            <a:srgbClr val="CC99FF"/>
+          </a:solidFill>
+          <a:ln w="25400"/>
+        </p:spPr>
+        <p:style>
+          <a:lnRef idx="2">
+            <a:schemeClr val="dk1"/>
+          </a:lnRef>
+          <a:fillRef idx="1">
+            <a:schemeClr val="lt1"/>
+          </a:fillRef>
+          <a:effectRef idx="0">
+            <a:schemeClr val="dk1"/>
+          </a:effectRef>
+          <a:fontRef idx="minor">
+            <a:schemeClr val="dk1"/>
+          </a:fontRef>
+        </p:style>
+        <p:txBody>
+          <a:bodyPr rtlCol="0" anchor="ctr"/>
+          <a:lstStyle/>
+          <a:p>
+            <a:pPr algn="ctr"/>
+            <a:r>
+              <a:rPr lang="en-US" dirty="0"/>
+              <a:t>5</a:t>
+            </a:r>
+          </a:p>
+        </p:txBody>
+      </p:sp>
+      <p:cxnSp>
+        <p:nvCxnSpPr>
+          <p:cNvPr id="158" name="Straight Arrow Connector 157">
+            <a:extLst>
+              <a:ext uri="{FF2B5EF4-FFF2-40B4-BE49-F238E27FC236}">
+                <a16:creationId xmlns:a16="http://schemas.microsoft.com/office/drawing/2014/main" id="{163452C0-0FEC-4AB6-9D73-6B34EDDD7269}"/>
+              </a:ext>
+            </a:extLst>
+          </p:cNvPr>
+          <p:cNvCxnSpPr>
+            <a:cxnSpLocks/>
+            <a:stCxn id="129" idx="3"/>
+            <a:endCxn id="138" idx="2"/>
+          </p:cNvCxnSpPr>
+          <p:nvPr/>
+        </p:nvCxnSpPr>
+        <p:spPr>
+          <a:xfrm flipV="1">
+            <a:off x="8207452" y="6054506"/>
+            <a:ext cx="606651" cy="441833"/>
+          </a:xfrm>
+          <a:prstGeom prst="straightConnector1">
+            <a:avLst/>
+          </a:prstGeom>
+          <a:ln w="38100">
+            <a:solidFill>
+              <a:schemeClr val="tx1"/>
+            </a:solidFill>
+            <a:tailEnd type="triangle"/>
+          </a:ln>
+        </p:spPr>
+        <p:style>
+          <a:lnRef idx="1">
+            <a:schemeClr val="accent1"/>
+          </a:lnRef>
+          <a:fillRef idx="0">
+            <a:schemeClr val="accent1"/>
+          </a:fillRef>
+          <a:effectRef idx="0">
+            <a:schemeClr val="accent1"/>
+          </a:effectRef>
+          <a:fontRef idx="minor">
+            <a:schemeClr val="tx1"/>
+          </a:fontRef>
+        </p:style>
+      </p:cxnSp>
+      <p:cxnSp>
+        <p:nvCxnSpPr>
+          <p:cNvPr id="161" name="Straight Arrow Connector 160">
+            <a:extLst>
+              <a:ext uri="{FF2B5EF4-FFF2-40B4-BE49-F238E27FC236}">
+                <a16:creationId xmlns:a16="http://schemas.microsoft.com/office/drawing/2014/main" id="{6F35E089-977F-4A62-8935-2D5A70D57DDB}"/>
+              </a:ext>
+            </a:extLst>
+          </p:cNvPr>
+          <p:cNvCxnSpPr>
+            <a:cxnSpLocks/>
+            <a:stCxn id="80" idx="3"/>
+            <a:endCxn id="135" idx="2"/>
+          </p:cNvCxnSpPr>
+          <p:nvPr/>
+        </p:nvCxnSpPr>
+        <p:spPr>
+          <a:xfrm flipV="1">
+            <a:off x="8326135" y="5500512"/>
+            <a:ext cx="165703" cy="7293"/>
+          </a:xfrm>
+          <a:prstGeom prst="straightConnector1">
+            <a:avLst/>
+          </a:prstGeom>
+          <a:ln w="38100">
+            <a:solidFill>
+              <a:schemeClr val="tx1"/>
+            </a:solidFill>
+            <a:tailEnd type="triangle"/>
+          </a:ln>
+        </p:spPr>
+        <p:style>
+          <a:lnRef idx="1">
+            <a:schemeClr val="accent1"/>
+          </a:lnRef>
+          <a:fillRef idx="0">
+            <a:schemeClr val="accent1"/>
+          </a:fillRef>
+          <a:effectRef idx="0">
+            <a:schemeClr val="accent1"/>
+          </a:effectRef>
+          <a:fontRef idx="minor">
+            <a:schemeClr val="tx1"/>
+          </a:fontRef>
+        </p:style>
+      </p:cxnSp>
+      <p:cxnSp>
+        <p:nvCxnSpPr>
+          <p:cNvPr id="165" name="Straight Arrow Connector 164">
+            <a:extLst>
+              <a:ext uri="{FF2B5EF4-FFF2-40B4-BE49-F238E27FC236}">
+                <a16:creationId xmlns:a16="http://schemas.microsoft.com/office/drawing/2014/main" id="{8FF038AC-8EA5-4C25-8B3A-6C6C4DCF1EDC}"/>
+              </a:ext>
+            </a:extLst>
+          </p:cNvPr>
+          <p:cNvCxnSpPr>
+            <a:cxnSpLocks/>
+            <a:stCxn id="131" idx="2"/>
+            <a:endCxn id="134" idx="0"/>
+          </p:cNvCxnSpPr>
+          <p:nvPr/>
+        </p:nvCxnSpPr>
+        <p:spPr>
+          <a:xfrm>
+            <a:off x="9241633" y="4672317"/>
+            <a:ext cx="8087" cy="162990"/>
+          </a:xfrm>
+          <a:prstGeom prst="straightConnector1">
+            <a:avLst/>
+          </a:prstGeom>
+          <a:ln w="38100">
+            <a:solidFill>
+              <a:schemeClr val="tx1"/>
+            </a:solidFill>
+            <a:tailEnd type="triangle"/>
+          </a:ln>
+        </p:spPr>
+        <p:style>
+          <a:lnRef idx="1">
+            <a:schemeClr val="accent1"/>
+          </a:lnRef>
+          <a:fillRef idx="0">
+            <a:schemeClr val="accent1"/>
+          </a:fillRef>
+          <a:effectRef idx="0">
+            <a:schemeClr val="accent1"/>
+          </a:effectRef>
+          <a:fontRef idx="minor">
+            <a:schemeClr val="tx1"/>
+          </a:fontRef>
+        </p:style>
+      </p:cxnSp>
+      <p:cxnSp>
+        <p:nvCxnSpPr>
+          <p:cNvPr id="169" name="Straight Arrow Connector 168">
+            <a:extLst>
+              <a:ext uri="{FF2B5EF4-FFF2-40B4-BE49-F238E27FC236}">
+                <a16:creationId xmlns:a16="http://schemas.microsoft.com/office/drawing/2014/main" id="{7DCBDCD6-1299-438D-8B7F-BE3B5E7C08EF}"/>
+              </a:ext>
+            </a:extLst>
+          </p:cNvPr>
+          <p:cNvCxnSpPr>
+            <a:cxnSpLocks/>
+            <a:stCxn id="133" idx="1"/>
+            <a:endCxn id="136" idx="6"/>
+          </p:cNvCxnSpPr>
+          <p:nvPr/>
+        </p:nvCxnSpPr>
+        <p:spPr>
+          <a:xfrm flipH="1">
+            <a:off x="9958142" y="5488664"/>
+            <a:ext cx="461976" cy="11848"/>
+          </a:xfrm>
+          <a:prstGeom prst="straightConnector1">
+            <a:avLst/>
+          </a:prstGeom>
+          <a:ln w="38100">
+            <a:solidFill>
+              <a:schemeClr val="tx1"/>
+            </a:solidFill>
+            <a:tailEnd type="triangle"/>
+          </a:ln>
+        </p:spPr>
+        <p:style>
+          <a:lnRef idx="1">
+            <a:schemeClr val="accent1"/>
+          </a:lnRef>
+          <a:fillRef idx="0">
+            <a:schemeClr val="accent1"/>
+          </a:fillRef>
+          <a:effectRef idx="0">
+            <a:schemeClr val="accent1"/>
+          </a:effectRef>
+          <a:fontRef idx="minor">
+            <a:schemeClr val="tx1"/>
+          </a:fontRef>
+        </p:style>
+      </p:cxnSp>
+      <p:cxnSp>
+        <p:nvCxnSpPr>
+          <p:cNvPr id="173" name="Straight Arrow Connector 172">
+            <a:extLst>
+              <a:ext uri="{FF2B5EF4-FFF2-40B4-BE49-F238E27FC236}">
+                <a16:creationId xmlns:a16="http://schemas.microsoft.com/office/drawing/2014/main" id="{86E845D8-5704-45F0-9FF9-E01CC9ECFC0D}"/>
+              </a:ext>
+            </a:extLst>
+          </p:cNvPr>
+          <p:cNvCxnSpPr>
+            <a:cxnSpLocks/>
+            <a:stCxn id="130" idx="1"/>
+            <a:endCxn id="140" idx="6"/>
+          </p:cNvCxnSpPr>
+          <p:nvPr/>
+        </p:nvCxnSpPr>
+        <p:spPr>
+          <a:xfrm flipH="1" flipV="1">
+            <a:off x="10290719" y="6054506"/>
+            <a:ext cx="347867" cy="6866"/>
           </a:xfrm>
           <a:prstGeom prst="straightConnector1">
             <a:avLst/>

</xml_diff>